<commit_message>
updated graphs to reorder legends
</commit_message>
<xml_diff>
--- a/outputs/legend_conf_presentation.pptx
+++ b/outputs/legend_conf_presentation.pptx
@@ -128,22 +128,30 @@
   <pc:docChgLst>
     <pc:chgData name="Andrew Baxter (student)" userId="b45e9002-b033-421d-a3d9-6d42475e9a3f" providerId="ADAL" clId="{8B4BE077-EB2F-483F-8E1C-5C74F5129D44}"/>
     <pc:docChg chg="custSel modSld">
-      <pc:chgData name="Andrew Baxter (student)" userId="b45e9002-b033-421d-a3d9-6d42475e9a3f" providerId="ADAL" clId="{8B4BE077-EB2F-483F-8E1C-5C74F5129D44}" dt="2019-10-28T15:33:35.083" v="0" actId="478"/>
+      <pc:chgData name="Andrew Baxter (student)" userId="b45e9002-b033-421d-a3d9-6d42475e9a3f" providerId="ADAL" clId="{8B4BE077-EB2F-483F-8E1C-5C74F5129D44}" dt="2019-10-31T11:15:15.690" v="1" actId="478"/>
       <pc:docMkLst>
         <pc:docMk/>
       </pc:docMkLst>
       <pc:sldChg chg="delSp">
-        <pc:chgData name="Andrew Baxter (student)" userId="b45e9002-b033-421d-a3d9-6d42475e9a3f" providerId="ADAL" clId="{8B4BE077-EB2F-483F-8E1C-5C74F5129D44}" dt="2019-10-28T15:33:35.083" v="0" actId="478"/>
+        <pc:chgData name="Andrew Baxter (student)" userId="b45e9002-b033-421d-a3d9-6d42475e9a3f" providerId="ADAL" clId="{8B4BE077-EB2F-483F-8E1C-5C74F5129D44}" dt="2019-10-31T11:15:15.690" v="1" actId="478"/>
         <pc:sldMkLst>
           <pc:docMk/>
           <pc:sldMk cId="0" sldId="256"/>
         </pc:sldMkLst>
         <pc:spChg chg="del">
-          <ac:chgData name="Andrew Baxter (student)" userId="b45e9002-b033-421d-a3d9-6d42475e9a3f" providerId="ADAL" clId="{8B4BE077-EB2F-483F-8E1C-5C74F5129D44}" dt="2019-10-28T15:33:35.083" v="0" actId="478"/>
+          <ac:chgData name="Andrew Baxter (student)" userId="b45e9002-b033-421d-a3d9-6d42475e9a3f" providerId="ADAL" clId="{8B4BE077-EB2F-483F-8E1C-5C74F5129D44}" dt="2019-10-31T11:15:08.546" v="0" actId="478"/>
           <ac:spMkLst>
             <pc:docMk/>
             <pc:sldMk cId="0" sldId="256"/>
             <ac:spMk id="3" creationId="{00000000-0000-0000-0000-000000000000}"/>
+          </ac:spMkLst>
+        </pc:spChg>
+        <pc:spChg chg="del">
+          <ac:chgData name="Andrew Baxter (student)" userId="b45e9002-b033-421d-a3d9-6d42475e9a3f" providerId="ADAL" clId="{8B4BE077-EB2F-483F-8E1C-5C74F5129D44}" dt="2019-10-31T11:15:15.690" v="1" actId="478"/>
+          <ac:spMkLst>
+            <pc:docMk/>
+            <pc:sldMk cId="0" sldId="256"/>
+            <ac:spMk id="4" creationId="{00000000-0000-0000-0000-000000000000}"/>
           </ac:spMkLst>
         </pc:spChg>
       </pc:sldChg>
@@ -333,7 +341,7 @@
           <a:p>
             <a:fld id="{6BA5D40C-A8DC-479A-A5D3-E7B4936A184B}" type="datetimeFigureOut">
               <a:rPr lang="en-GB" smtClean="0"/>
-              <a:t>28/10/2019</a:t>
+              <a:t>31/10/2019</a:t>
             </a:fld>
             <a:endParaRPr lang="en-GB"/>
           </a:p>
@@ -503,7 +511,7 @@
           <a:p>
             <a:fld id="{6BA5D40C-A8DC-479A-A5D3-E7B4936A184B}" type="datetimeFigureOut">
               <a:rPr lang="en-GB" smtClean="0"/>
-              <a:t>28/10/2019</a:t>
+              <a:t>31/10/2019</a:t>
             </a:fld>
             <a:endParaRPr lang="en-GB"/>
           </a:p>
@@ -683,7 +691,7 @@
           <a:p>
             <a:fld id="{6BA5D40C-A8DC-479A-A5D3-E7B4936A184B}" type="datetimeFigureOut">
               <a:rPr lang="en-GB" smtClean="0"/>
-              <a:t>28/10/2019</a:t>
+              <a:t>31/10/2019</a:t>
             </a:fld>
             <a:endParaRPr lang="en-GB"/>
           </a:p>
@@ -853,7 +861,7 @@
           <a:p>
             <a:fld id="{6BA5D40C-A8DC-479A-A5D3-E7B4936A184B}" type="datetimeFigureOut">
               <a:rPr lang="en-GB" smtClean="0"/>
-              <a:t>28/10/2019</a:t>
+              <a:t>31/10/2019</a:t>
             </a:fld>
             <a:endParaRPr lang="en-GB"/>
           </a:p>
@@ -1099,7 +1107,7 @@
           <a:p>
             <a:fld id="{6BA5D40C-A8DC-479A-A5D3-E7B4936A184B}" type="datetimeFigureOut">
               <a:rPr lang="en-GB" smtClean="0"/>
-              <a:t>28/10/2019</a:t>
+              <a:t>31/10/2019</a:t>
             </a:fld>
             <a:endParaRPr lang="en-GB"/>
           </a:p>
@@ -1387,7 +1395,7 @@
           <a:p>
             <a:fld id="{6BA5D40C-A8DC-479A-A5D3-E7B4936A184B}" type="datetimeFigureOut">
               <a:rPr lang="en-GB" smtClean="0"/>
-              <a:t>28/10/2019</a:t>
+              <a:t>31/10/2019</a:t>
             </a:fld>
             <a:endParaRPr lang="en-GB"/>
           </a:p>
@@ -1814,7 +1822,7 @@
           <a:p>
             <a:fld id="{6BA5D40C-A8DC-479A-A5D3-E7B4936A184B}" type="datetimeFigureOut">
               <a:rPr lang="en-GB" smtClean="0"/>
-              <a:t>28/10/2019</a:t>
+              <a:t>31/10/2019</a:t>
             </a:fld>
             <a:endParaRPr lang="en-GB"/>
           </a:p>
@@ -1932,7 +1940,7 @@
           <a:p>
             <a:fld id="{6BA5D40C-A8DC-479A-A5D3-E7B4936A184B}" type="datetimeFigureOut">
               <a:rPr lang="en-GB" smtClean="0"/>
-              <a:t>28/10/2019</a:t>
+              <a:t>31/10/2019</a:t>
             </a:fld>
             <a:endParaRPr lang="en-GB"/>
           </a:p>
@@ -2027,7 +2035,7 @@
           <a:p>
             <a:fld id="{6BA5D40C-A8DC-479A-A5D3-E7B4936A184B}" type="datetimeFigureOut">
               <a:rPr lang="en-GB" smtClean="0"/>
-              <a:t>28/10/2019</a:t>
+              <a:t>31/10/2019</a:t>
             </a:fld>
             <a:endParaRPr lang="en-GB"/>
           </a:p>
@@ -2304,7 +2312,7 @@
           <a:p>
             <a:fld id="{6BA5D40C-A8DC-479A-A5D3-E7B4936A184B}" type="datetimeFigureOut">
               <a:rPr lang="en-GB" smtClean="0"/>
-              <a:t>28/10/2019</a:t>
+              <a:t>31/10/2019</a:t>
             </a:fld>
             <a:endParaRPr lang="en-GB"/>
           </a:p>
@@ -2557,7 +2565,7 @@
           <a:p>
             <a:fld id="{6BA5D40C-A8DC-479A-A5D3-E7B4936A184B}" type="datetimeFigureOut">
               <a:rPr lang="en-GB" smtClean="0"/>
-              <a:t>28/10/2019</a:t>
+              <a:t>31/10/2019</a:t>
             </a:fld>
             <a:endParaRPr lang="en-GB"/>
           </a:p>
@@ -2770,7 +2778,7 @@
           <a:p>
             <a:fld id="{6BA5D40C-A8DC-479A-A5D3-E7B4936A184B}" type="datetimeFigureOut">
               <a:rPr lang="en-GB" smtClean="0"/>
-              <a:t>28/10/2019</a:t>
+              <a:t>31/10/2019</a:t>
             </a:fld>
             <a:endParaRPr lang="en-GB"/>
           </a:p>
@@ -3153,22 +3161,22 @@
         </p:nvGrpSpPr>
         <p:grpSpPr>
           <a:xfrm>
-            <a:off x="2589152" y="1733673"/>
-            <a:ext cx="2289319" cy="1844030"/>
-            <a:chOff x="2589152" y="1733673"/>
-            <a:chExt cx="2289319" cy="1844030"/>
+            <a:off x="2589152" y="1809111"/>
+            <a:ext cx="2289319" cy="1693154"/>
+            <a:chOff x="2589152" y="1809111"/>
+            <a:chExt cx="2289319" cy="1693154"/>
           </a:xfrm>
         </p:grpSpPr>
         <p:sp>
           <p:nvSpPr>
-            <p:cNvPr id="4" name="tx4"/>
+            <p:cNvPr id="5" name="tx5"/>
             <p:cNvSpPr/>
             <p:nvPr/>
           </p:nvSpPr>
           <p:spPr>
             <a:xfrm>
-              <a:off x="2589152" y="1733673"/>
-              <a:ext cx="535675" cy="103410"/>
+              <a:off x="2589152" y="1809111"/>
+              <a:ext cx="1226740" cy="103410"/>
             </a:xfrm>
             <a:prstGeom prst="rect">
               <a:avLst/>
@@ -3193,60 +3201,14 @@
               <a:r>
                 <a:rPr sz="1100">
                   <a:solidFill>
-                    <a:srgbClr val="000000">
+                    <a:srgbClr val="FFFFFF">
                       <a:alpha val="100000"/>
                     </a:srgbClr>
                   </a:solidFill>
                   <a:latin typeface="Arial"/>
                   <a:cs typeface="Arial"/>
                 </a:rPr>
-                <a:t>Conflicts</a:t>
-              </a:r>
-            </a:p>
-          </p:txBody>
-        </p:sp>
-        <p:sp>
-          <p:nvSpPr>
-            <p:cNvPr id="5" name="tx5"/>
-            <p:cNvSpPr/>
-            <p:nvPr/>
-          </p:nvSpPr>
-          <p:spPr>
-            <a:xfrm>
-              <a:off x="2589152" y="1886322"/>
-              <a:ext cx="574693" cy="101637"/>
-            </a:xfrm>
-            <a:prstGeom prst="rect">
-              <a:avLst/>
-            </a:prstGeom>
-            <a:noFill/>
-          </p:spPr>
-          <p:txBody>
-            <a:bodyPr wrap="none" lIns="0" tIns="0" rIns="0" bIns="0" anchor="ctr" anchorCtr="1"/>
-            <a:lstStyle/>
-            <a:p>
-              <a:pPr marL="0" marR="0" indent="0" algn="l">
-                <a:lnSpc>
-                  <a:spcPts val="1100"/>
-                </a:lnSpc>
-                <a:spcBef>
-                  <a:spcPts val="0"/>
-                </a:spcBef>
-                <a:spcAft>
-                  <a:spcPts val="0"/>
-                </a:spcAft>
-              </a:pPr>
-              <a:r>
-                <a:rPr sz="1100">
-                  <a:solidFill>
-                    <a:srgbClr val="000000">
-                      <a:alpha val="100000"/>
-                    </a:srgbClr>
-                  </a:solidFill>
-                  <a:latin typeface="Arial"/>
-                  <a:cs typeface="Arial"/>
-                </a:rPr>
-                <a:t>declared:</a:t>
+                <a:t>Conflicts of interest:</a:t>
               </a:r>
             </a:p>
           </p:txBody>
@@ -3259,7 +3221,118 @@
           </p:nvSpPr>
           <p:spPr>
             <a:xfrm>
-              <a:off x="2626627" y="2116461"/>
+              <a:off x="2626627" y="2041023"/>
+              <a:ext cx="144506" cy="144506"/>
+            </a:xfrm>
+            <a:prstGeom prst="ellipse">
+              <a:avLst/>
+            </a:prstGeom>
+            <a:solidFill>
+              <a:srgbClr val="DC9DBE">
+                <a:alpha val="100000"/>
+              </a:srgbClr>
+            </a:solidFill>
+            <a:ln w="9000" cap="rnd">
+              <a:solidFill>
+                <a:srgbClr val="DC9DBE">
+                  <a:alpha val="100000"/>
+                </a:srgbClr>
+              </a:solidFill>
+              <a:prstDash val="solid"/>
+              <a:round/>
+            </a:ln>
+          </p:spPr>
+          <p:txBody>
+            <a:bodyPr/>
+            <a:lstStyle/>
+            <a:p>
+              <a:endParaRPr/>
+            </a:p>
+          </p:txBody>
+        </p:sp>
+        <p:sp>
+          <p:nvSpPr>
+            <p:cNvPr id="7" name="pt7"/>
+            <p:cNvSpPr/>
+            <p:nvPr/>
+          </p:nvSpPr>
+          <p:spPr>
+            <a:xfrm>
+              <a:off x="2626627" y="2260479"/>
+              <a:ext cx="144506" cy="144506"/>
+            </a:xfrm>
+            <a:prstGeom prst="ellipse">
+              <a:avLst/>
+            </a:prstGeom>
+            <a:solidFill>
+              <a:srgbClr val="7F00FF">
+                <a:alpha val="100000"/>
+              </a:srgbClr>
+            </a:solidFill>
+            <a:ln w="9000" cap="rnd">
+              <a:solidFill>
+                <a:srgbClr val="7F00FF">
+                  <a:alpha val="100000"/>
+                </a:srgbClr>
+              </a:solidFill>
+              <a:prstDash val="solid"/>
+              <a:round/>
+            </a:ln>
+          </p:spPr>
+          <p:txBody>
+            <a:bodyPr/>
+            <a:lstStyle/>
+            <a:p>
+              <a:endParaRPr/>
+            </a:p>
+          </p:txBody>
+        </p:sp>
+        <p:sp>
+          <p:nvSpPr>
+            <p:cNvPr id="8" name="pt8"/>
+            <p:cNvSpPr/>
+            <p:nvPr/>
+          </p:nvSpPr>
+          <p:spPr>
+            <a:xfrm>
+              <a:off x="2626627" y="2479935"/>
+              <a:ext cx="144506" cy="144506"/>
+            </a:xfrm>
+            <a:prstGeom prst="ellipse">
+              <a:avLst/>
+            </a:prstGeom>
+            <a:solidFill>
+              <a:srgbClr val="9D5524">
+                <a:alpha val="100000"/>
+              </a:srgbClr>
+            </a:solidFill>
+            <a:ln w="9000" cap="rnd">
+              <a:solidFill>
+                <a:srgbClr val="9D5524">
+                  <a:alpha val="100000"/>
+                </a:srgbClr>
+              </a:solidFill>
+              <a:prstDash val="solid"/>
+              <a:round/>
+            </a:ln>
+          </p:spPr>
+          <p:txBody>
+            <a:bodyPr/>
+            <a:lstStyle/>
+            <a:p>
+              <a:endParaRPr/>
+            </a:p>
+          </p:txBody>
+        </p:sp>
+        <p:sp>
+          <p:nvSpPr>
+            <p:cNvPr id="9" name="pt9"/>
+            <p:cNvSpPr/>
+            <p:nvPr/>
+          </p:nvSpPr>
+          <p:spPr>
+            <a:xfrm>
+              <a:off x="2626627" y="2699391"/>
               <a:ext cx="144506" cy="144506"/>
             </a:xfrm>
             <a:prstGeom prst="ellipse">
@@ -3290,13 +3363,13 @@
         </p:sp>
         <p:sp>
           <p:nvSpPr>
-            <p:cNvPr id="7" name="pt7"/>
+            <p:cNvPr id="10" name="pt10"/>
             <p:cNvSpPr/>
             <p:nvPr/>
           </p:nvSpPr>
           <p:spPr>
             <a:xfrm>
-              <a:off x="2626627" y="2335917"/>
+              <a:off x="2626627" y="2918847"/>
               <a:ext cx="144506" cy="144506"/>
             </a:xfrm>
             <a:prstGeom prst="ellipse">
@@ -3327,124 +3400,13 @@
         </p:sp>
         <p:sp>
           <p:nvSpPr>
-            <p:cNvPr id="8" name="pt8"/>
-            <p:cNvSpPr/>
-            <p:nvPr/>
-          </p:nvSpPr>
-          <p:spPr>
-            <a:xfrm>
-              <a:off x="2626627" y="2555373"/>
-              <a:ext cx="144506" cy="144506"/>
-            </a:xfrm>
-            <a:prstGeom prst="ellipse">
-              <a:avLst/>
-            </a:prstGeom>
-            <a:solidFill>
-              <a:srgbClr val="7F00FF">
-                <a:alpha val="100000"/>
-              </a:srgbClr>
-            </a:solidFill>
-            <a:ln w="9000" cap="rnd">
-              <a:solidFill>
-                <a:srgbClr val="7F00FF">
-                  <a:alpha val="100000"/>
-                </a:srgbClr>
-              </a:solidFill>
-              <a:prstDash val="solid"/>
-              <a:round/>
-            </a:ln>
-          </p:spPr>
-          <p:txBody>
-            <a:bodyPr/>
-            <a:lstStyle/>
-            <a:p>
-              <a:endParaRPr/>
-            </a:p>
-          </p:txBody>
-        </p:sp>
-        <p:sp>
-          <p:nvSpPr>
-            <p:cNvPr id="9" name="pt9"/>
-            <p:cNvSpPr/>
-            <p:nvPr/>
-          </p:nvSpPr>
-          <p:spPr>
-            <a:xfrm>
-              <a:off x="2626627" y="2774829"/>
-              <a:ext cx="144506" cy="144506"/>
-            </a:xfrm>
-            <a:prstGeom prst="ellipse">
-              <a:avLst/>
-            </a:prstGeom>
-            <a:solidFill>
-              <a:srgbClr val="DC9DBE">
-                <a:alpha val="100000"/>
-              </a:srgbClr>
-            </a:solidFill>
-            <a:ln w="9000" cap="rnd">
-              <a:solidFill>
-                <a:srgbClr val="DC9DBE">
-                  <a:alpha val="100000"/>
-                </a:srgbClr>
-              </a:solidFill>
-              <a:prstDash val="solid"/>
-              <a:round/>
-            </a:ln>
-          </p:spPr>
-          <p:txBody>
-            <a:bodyPr/>
-            <a:lstStyle/>
-            <a:p>
-              <a:endParaRPr/>
-            </a:p>
-          </p:txBody>
-        </p:sp>
-        <p:sp>
-          <p:nvSpPr>
-            <p:cNvPr id="10" name="pt10"/>
-            <p:cNvSpPr/>
-            <p:nvPr/>
-          </p:nvSpPr>
-          <p:spPr>
-            <a:xfrm>
-              <a:off x="2626627" y="2994285"/>
-              <a:ext cx="144506" cy="144506"/>
-            </a:xfrm>
-            <a:prstGeom prst="ellipse">
-              <a:avLst/>
-            </a:prstGeom>
-            <a:solidFill>
-              <a:srgbClr val="9D5524">
-                <a:alpha val="100000"/>
-              </a:srgbClr>
-            </a:solidFill>
-            <a:ln w="9000" cap="rnd">
-              <a:solidFill>
-                <a:srgbClr val="9D5524">
-                  <a:alpha val="100000"/>
-                </a:srgbClr>
-              </a:solidFill>
-              <a:prstDash val="solid"/>
-              <a:round/>
-            </a:ln>
-          </p:spPr>
-          <p:txBody>
-            <a:bodyPr/>
-            <a:lstStyle/>
-            <a:p>
-              <a:endParaRPr/>
-            </a:p>
-          </p:txBody>
-        </p:sp>
-        <p:sp>
-          <p:nvSpPr>
             <p:cNvPr id="11" name="pt11"/>
             <p:cNvSpPr/>
             <p:nvPr/>
           </p:nvSpPr>
           <p:spPr>
             <a:xfrm>
-              <a:off x="2626627" y="3213741"/>
+              <a:off x="2626627" y="3138303"/>
               <a:ext cx="144506" cy="144506"/>
             </a:xfrm>
             <a:prstGeom prst="ellipse">
@@ -3481,7 +3443,7 @@
           </p:nvSpPr>
           <p:spPr>
             <a:xfrm>
-              <a:off x="2626627" y="3433197"/>
+              <a:off x="2626627" y="3357759"/>
               <a:ext cx="144506" cy="144506"/>
             </a:xfrm>
             <a:prstGeom prst="ellipse">
@@ -3518,7 +3480,145 @@
           </p:nvSpPr>
           <p:spPr>
             <a:xfrm>
-              <a:off x="2878197" y="2123830"/>
+              <a:off x="2878197" y="2048392"/>
+              <a:ext cx="956726" cy="104884"/>
+            </a:xfrm>
+            <a:prstGeom prst="rect">
+              <a:avLst/>
+            </a:prstGeom>
+            <a:noFill/>
+          </p:spPr>
+          <p:txBody>
+            <a:bodyPr wrap="none" lIns="0" tIns="0" rIns="0" bIns="0" anchor="ctr" anchorCtr="1"/>
+            <a:lstStyle/>
+            <a:p>
+              <a:pPr marL="0" marR="0" indent="0" algn="l">
+                <a:lnSpc>
+                  <a:spcPts val="880"/>
+                </a:lnSpc>
+                <a:spcBef>
+                  <a:spcPts val="0"/>
+                </a:spcBef>
+                <a:spcAft>
+                  <a:spcPts val="0"/>
+                </a:spcAft>
+              </a:pPr>
+              <a:r>
+                <a:rPr sz="880">
+                  <a:solidFill>
+                    <a:srgbClr val="FFFFFF">
+                      <a:alpha val="100000"/>
+                    </a:srgbClr>
+                  </a:solidFill>
+                  <a:latin typeface="Arial"/>
+                  <a:cs typeface="Arial"/>
+                </a:rPr>
+                <a:t>None declared (40)</a:t>
+              </a:r>
+            </a:p>
+          </p:txBody>
+        </p:sp>
+        <p:sp>
+          <p:nvSpPr>
+            <p:cNvPr id="14" name="tx14"/>
+            <p:cNvSpPr/>
+            <p:nvPr/>
+          </p:nvSpPr>
+          <p:spPr>
+            <a:xfrm>
+              <a:off x="2878197" y="2267848"/>
+              <a:ext cx="801310" cy="104884"/>
+            </a:xfrm>
+            <a:prstGeom prst="rect">
+              <a:avLst/>
+            </a:prstGeom>
+            <a:noFill/>
+          </p:spPr>
+          <p:txBody>
+            <a:bodyPr wrap="none" lIns="0" tIns="0" rIns="0" bIns="0" anchor="ctr" anchorCtr="1"/>
+            <a:lstStyle/>
+            <a:p>
+              <a:pPr marL="0" marR="0" indent="0" algn="l">
+                <a:lnSpc>
+                  <a:spcPts val="880"/>
+                </a:lnSpc>
+                <a:spcBef>
+                  <a:spcPts val="0"/>
+                </a:spcBef>
+                <a:spcAft>
+                  <a:spcPts val="0"/>
+                </a:spcAft>
+              </a:pPr>
+              <a:r>
+                <a:rPr sz="880">
+                  <a:solidFill>
+                    <a:srgbClr val="FFFFFF">
+                      <a:alpha val="100000"/>
+                    </a:srgbClr>
+                  </a:solidFill>
+                  <a:latin typeface="Arial"/>
+                  <a:cs typeface="Arial"/>
+                </a:rPr>
+                <a:t>No mention (29)</a:t>
+              </a:r>
+            </a:p>
+          </p:txBody>
+        </p:sp>
+        <p:sp>
+          <p:nvSpPr>
+            <p:cNvPr id="15" name="tx15"/>
+            <p:cNvSpPr/>
+            <p:nvPr/>
+          </p:nvSpPr>
+          <p:spPr>
+            <a:xfrm>
+              <a:off x="2878197" y="2487304"/>
+              <a:ext cx="1000055" cy="104884"/>
+            </a:xfrm>
+            <a:prstGeom prst="rect">
+              <a:avLst/>
+            </a:prstGeom>
+            <a:noFill/>
+          </p:spPr>
+          <p:txBody>
+            <a:bodyPr wrap="none" lIns="0" tIns="0" rIns="0" bIns="0" anchor="ctr" anchorCtr="1"/>
+            <a:lstStyle/>
+            <a:p>
+              <a:pPr marL="0" marR="0" indent="0" algn="l">
+                <a:lnSpc>
+                  <a:spcPts val="880"/>
+                </a:lnSpc>
+                <a:spcBef>
+                  <a:spcPts val="0"/>
+                </a:spcBef>
+                <a:spcAft>
+                  <a:spcPts val="0"/>
+                </a:spcAft>
+              </a:pPr>
+              <a:r>
+                <a:rPr sz="880">
+                  <a:solidFill>
+                    <a:srgbClr val="FFFFFF">
+                      <a:alpha val="100000"/>
+                    </a:srgbClr>
+                  </a:solidFill>
+                  <a:latin typeface="Arial"/>
+                  <a:cs typeface="Arial"/>
+                </a:rPr>
+                <a:t>Pharmaceutical (13)</a:t>
+              </a:r>
+            </a:p>
+          </p:txBody>
+        </p:sp>
+        <p:sp>
+          <p:nvSpPr>
+            <p:cNvPr id="16" name="tx16"/>
+            <p:cNvSpPr/>
+            <p:nvPr/>
+          </p:nvSpPr>
+          <p:spPr>
+            <a:xfrm>
+              <a:off x="2878197" y="2706760"/>
               <a:ext cx="2000274" cy="104884"/>
             </a:xfrm>
             <a:prstGeom prst="rect">
@@ -3544,7 +3644,7 @@
               <a:r>
                 <a:rPr sz="880">
                   <a:solidFill>
-                    <a:srgbClr val="000000">
+                    <a:srgbClr val="FFFFFF">
                       <a:alpha val="100000"/>
                     </a:srgbClr>
                   </a:solidFill>
@@ -3558,60 +3658,14 @@
         </p:sp>
         <p:sp>
           <p:nvSpPr>
-            <p:cNvPr id="14" name="tx14"/>
+            <p:cNvPr id="17" name="tx17"/>
             <p:cNvSpPr/>
             <p:nvPr/>
           </p:nvSpPr>
           <p:spPr>
             <a:xfrm>
-              <a:off x="2878197" y="2343286"/>
+              <a:off x="2878197" y="2926216"/>
               <a:ext cx="708049" cy="104884"/>
-            </a:xfrm>
-            <a:prstGeom prst="rect">
-              <a:avLst/>
-            </a:prstGeom>
-            <a:noFill/>
-          </p:spPr>
-          <p:txBody>
-            <a:bodyPr wrap="none" lIns="0" tIns="0" rIns="0" bIns="0" anchor="ctr" anchorCtr="1"/>
-            <a:lstStyle/>
-            <a:p>
-              <a:pPr marL="0" marR="0" indent="0" algn="l">
-                <a:lnSpc>
-                  <a:spcPts val="880"/>
-                </a:lnSpc>
-                <a:spcBef>
-                  <a:spcPts val="0"/>
-                </a:spcBef>
-                <a:spcAft>
-                  <a:spcPts val="0"/>
-                </a:spcAft>
-              </a:pPr>
-              <a:r>
-                <a:rPr sz="880" dirty="0">
-                  <a:solidFill>
-                    <a:srgbClr val="000000">
-                      <a:alpha val="100000"/>
-                    </a:srgbClr>
-                  </a:solidFill>
-                  <a:latin typeface="Arial"/>
-                  <a:cs typeface="Arial"/>
-                </a:rPr>
-                <a:t>E-cigarette (5)</a:t>
-              </a:r>
-            </a:p>
-          </p:txBody>
-        </p:sp>
-        <p:sp>
-          <p:nvSpPr>
-            <p:cNvPr id="15" name="tx15"/>
-            <p:cNvSpPr/>
-            <p:nvPr/>
-          </p:nvSpPr>
-          <p:spPr>
-            <a:xfrm>
-              <a:off x="2878197" y="2562742"/>
-              <a:ext cx="1329223" cy="104884"/>
             </a:xfrm>
             <a:prstGeom prst="rect">
               <a:avLst/>
@@ -3636,106 +3690,14 @@
               <a:r>
                 <a:rPr sz="880">
                   <a:solidFill>
-                    <a:srgbClr val="000000">
+                    <a:srgbClr val="FFFFFF">
                       <a:alpha val="100000"/>
                     </a:srgbClr>
                   </a:solidFill>
                   <a:latin typeface="Arial"/>
                   <a:cs typeface="Arial"/>
                 </a:rPr>
-                <a:t>No conflicts of interest (40)</a:t>
-              </a:r>
-            </a:p>
-          </p:txBody>
-        </p:sp>
-        <p:sp>
-          <p:nvSpPr>
-            <p:cNvPr id="16" name="tx16"/>
-            <p:cNvSpPr/>
-            <p:nvPr/>
-          </p:nvSpPr>
-          <p:spPr>
-            <a:xfrm>
-              <a:off x="2878197" y="2782198"/>
-              <a:ext cx="1664721" cy="104884"/>
-            </a:xfrm>
-            <a:prstGeom prst="rect">
-              <a:avLst/>
-            </a:prstGeom>
-            <a:noFill/>
-          </p:spPr>
-          <p:txBody>
-            <a:bodyPr wrap="none" lIns="0" tIns="0" rIns="0" bIns="0" anchor="ctr" anchorCtr="1"/>
-            <a:lstStyle/>
-            <a:p>
-              <a:pPr marL="0" marR="0" indent="0" algn="l">
-                <a:lnSpc>
-                  <a:spcPts val="880"/>
-                </a:lnSpc>
-                <a:spcBef>
-                  <a:spcPts val="0"/>
-                </a:spcBef>
-                <a:spcAft>
-                  <a:spcPts val="0"/>
-                </a:spcAft>
-              </a:pPr>
-              <a:r>
-                <a:rPr sz="880">
-                  <a:solidFill>
-                    <a:srgbClr val="000000">
-                      <a:alpha val="100000"/>
-                    </a:srgbClr>
-                  </a:solidFill>
-                  <a:latin typeface="Arial"/>
-                  <a:cs typeface="Arial"/>
-                </a:rPr>
-                <a:t>No conflicts of interest stated (29)</a:t>
-              </a:r>
-            </a:p>
-          </p:txBody>
-        </p:sp>
-        <p:sp>
-          <p:nvSpPr>
-            <p:cNvPr id="17" name="tx17"/>
-            <p:cNvSpPr/>
-            <p:nvPr/>
-          </p:nvSpPr>
-          <p:spPr>
-            <a:xfrm>
-              <a:off x="2878197" y="3001599"/>
-              <a:ext cx="496808" cy="104938"/>
-            </a:xfrm>
-            <a:prstGeom prst="rect">
-              <a:avLst/>
-            </a:prstGeom>
-            <a:noFill/>
-          </p:spPr>
-          <p:txBody>
-            <a:bodyPr wrap="none" lIns="0" tIns="0" rIns="0" bIns="0" anchor="ctr" anchorCtr="1"/>
-            <a:lstStyle/>
-            <a:p>
-              <a:pPr marL="0" marR="0" indent="0" algn="l">
-                <a:lnSpc>
-                  <a:spcPts val="880"/>
-                </a:lnSpc>
-                <a:spcBef>
-                  <a:spcPts val="0"/>
-                </a:spcBef>
-                <a:spcAft>
-                  <a:spcPts val="0"/>
-                </a:spcAft>
-              </a:pPr>
-              <a:r>
-                <a:rPr sz="880">
-                  <a:solidFill>
-                    <a:srgbClr val="000000">
-                      <a:alpha val="100000"/>
-                    </a:srgbClr>
-                  </a:solidFill>
-                  <a:latin typeface="Arial"/>
-                  <a:cs typeface="Arial"/>
-                </a:rPr>
-                <a:t>Outlier (1)</a:t>
+                <a:t>E-cigarette (5)</a:t>
               </a:r>
             </a:p>
           </p:txBody>
@@ -3748,53 +3710,7 @@
           </p:nvSpPr>
           <p:spPr>
             <a:xfrm>
-              <a:off x="2878197" y="3221110"/>
-              <a:ext cx="1000055" cy="104884"/>
-            </a:xfrm>
-            <a:prstGeom prst="rect">
-              <a:avLst/>
-            </a:prstGeom>
-            <a:noFill/>
-          </p:spPr>
-          <p:txBody>
-            <a:bodyPr wrap="none" lIns="0" tIns="0" rIns="0" bIns="0" anchor="ctr" anchorCtr="1"/>
-            <a:lstStyle/>
-            <a:p>
-              <a:pPr marL="0" marR="0" indent="0" algn="l">
-                <a:lnSpc>
-                  <a:spcPts val="880"/>
-                </a:lnSpc>
-                <a:spcBef>
-                  <a:spcPts val="0"/>
-                </a:spcBef>
-                <a:spcAft>
-                  <a:spcPts val="0"/>
-                </a:spcAft>
-              </a:pPr>
-              <a:r>
-                <a:rPr sz="880">
-                  <a:solidFill>
-                    <a:srgbClr val="000000">
-                      <a:alpha val="100000"/>
-                    </a:srgbClr>
-                  </a:solidFill>
-                  <a:latin typeface="Arial"/>
-                  <a:cs typeface="Arial"/>
-                </a:rPr>
-                <a:t>Pharmaceutical (13)</a:t>
-              </a:r>
-            </a:p>
-          </p:txBody>
-        </p:sp>
-        <p:sp>
-          <p:nvSpPr>
-            <p:cNvPr id="19" name="tx19"/>
-            <p:cNvSpPr/>
-            <p:nvPr/>
-          </p:nvSpPr>
-          <p:spPr>
-            <a:xfrm>
-              <a:off x="2878197" y="3440566"/>
+              <a:off x="2878197" y="3145672"/>
               <a:ext cx="1080819" cy="104884"/>
             </a:xfrm>
             <a:prstGeom prst="rect">
@@ -3820,7 +3736,7 @@
               <a:r>
                 <a:rPr sz="880">
                   <a:solidFill>
-                    <a:srgbClr val="000000">
+                    <a:srgbClr val="FFFFFF">
                       <a:alpha val="100000"/>
                     </a:srgbClr>
                   </a:solidFill>
@@ -3828,6 +3744,52 @@
                   <a:cs typeface="Arial"/>
                 </a:rPr>
                 <a:t>Tobacco company (1)</a:t>
+              </a:r>
+            </a:p>
+          </p:txBody>
+        </p:sp>
+        <p:sp>
+          <p:nvSpPr>
+            <p:cNvPr id="19" name="tx19"/>
+            <p:cNvSpPr/>
+            <p:nvPr/>
+          </p:nvSpPr>
+          <p:spPr>
+            <a:xfrm>
+              <a:off x="2878197" y="3365128"/>
+              <a:ext cx="1447422" cy="104884"/>
+            </a:xfrm>
+            <a:prstGeom prst="rect">
+              <a:avLst/>
+            </a:prstGeom>
+            <a:noFill/>
+          </p:spPr>
+          <p:txBody>
+            <a:bodyPr wrap="none" lIns="0" tIns="0" rIns="0" bIns="0" anchor="ctr" anchorCtr="1"/>
+            <a:lstStyle/>
+            <a:p>
+              <a:pPr marL="0" marR="0" indent="0" algn="l">
+                <a:lnSpc>
+                  <a:spcPts val="880"/>
+                </a:lnSpc>
+                <a:spcBef>
+                  <a:spcPts val="0"/>
+                </a:spcBef>
+                <a:spcAft>
+                  <a:spcPts val="0"/>
+                </a:spcAft>
+              </a:pPr>
+              <a:r>
+                <a:rPr sz="880">
+                  <a:solidFill>
+                    <a:srgbClr val="FFFFFF">
+                      <a:alpha val="100000"/>
+                    </a:srgbClr>
+                  </a:solidFill>
+                  <a:latin typeface="Arial"/>
+                  <a:cs typeface="Arial"/>
+                </a:rPr>
+                <a:t>Tobacco control advocate (1)</a:t>
               </a:r>
             </a:p>
           </p:txBody>

</xml_diff>

<commit_message>
corrected conflicts of interest legend
</commit_message>
<xml_diff>
--- a/outputs/legend_conf_presentation.pptx
+++ b/outputs/legend_conf_presentation.pptx
@@ -4,17 +4,17 @@
   <p:sldMasterIdLst>
     <p:sldMasterId id="2147483648" r:id="rId1"/>
   </p:sldMasterIdLst>
-  <p:sldIdLst>
-    <p:sldId id="256" r:id="rId2"/>
+  <p:sldIdLst xmlns:a="http://schemas.openxmlformats.org/drawingml/2006/main" xmlns:r="http://schemas.openxmlformats.org/officeDocument/2006/relationships" xmlns:p="http://schemas.openxmlformats.org/presentationml/2006/main">
+    <p:sldId id="256" r:id="rId6"/>
   </p:sldIdLst>
-  <p:sldSz cx="7562850" cy="5330825"/>
+  <p:sldSz cx="10698163" cy="7562850"/>
   <p:notesSz cx="6858000" cy="9144000"/>
   <p:defaultTextStyle>
     <a:defPPr>
       <a:defRPr lang="en-US"/>
     </a:defPPr>
-    <a:lvl1pPr marL="0" algn="l" defTabSz="526227" rtl="0" eaLnBrk="1" latinLnBrk="0" hangingPunct="1">
-      <a:defRPr sz="1100" kern="1200">
+    <a:lvl1pPr marL="0" algn="l" defTabSz="995964" rtl="0" eaLnBrk="1" latinLnBrk="0" hangingPunct="1">
+      <a:defRPr sz="2000" kern="1200">
         <a:solidFill>
           <a:schemeClr val="tx1"/>
         </a:solidFill>
@@ -23,8 +23,8 @@
         <a:cs typeface="+mn-cs"/>
       </a:defRPr>
     </a:lvl1pPr>
-    <a:lvl2pPr marL="263113" algn="l" defTabSz="526227" rtl="0" eaLnBrk="1" latinLnBrk="0" hangingPunct="1">
-      <a:defRPr sz="1100" kern="1200">
+    <a:lvl2pPr marL="497982" algn="l" defTabSz="995964" rtl="0" eaLnBrk="1" latinLnBrk="0" hangingPunct="1">
+      <a:defRPr sz="2000" kern="1200">
         <a:solidFill>
           <a:schemeClr val="tx1"/>
         </a:solidFill>
@@ -33,8 +33,8 @@
         <a:cs typeface="+mn-cs"/>
       </a:defRPr>
     </a:lvl2pPr>
-    <a:lvl3pPr marL="526227" algn="l" defTabSz="526227" rtl="0" eaLnBrk="1" latinLnBrk="0" hangingPunct="1">
-      <a:defRPr sz="1100" kern="1200">
+    <a:lvl3pPr marL="995964" algn="l" defTabSz="995964" rtl="0" eaLnBrk="1" latinLnBrk="0" hangingPunct="1">
+      <a:defRPr sz="2000" kern="1200">
         <a:solidFill>
           <a:schemeClr val="tx1"/>
         </a:solidFill>
@@ -43,8 +43,8 @@
         <a:cs typeface="+mn-cs"/>
       </a:defRPr>
     </a:lvl3pPr>
-    <a:lvl4pPr marL="789341" algn="l" defTabSz="526227" rtl="0" eaLnBrk="1" latinLnBrk="0" hangingPunct="1">
-      <a:defRPr sz="1100" kern="1200">
+    <a:lvl4pPr marL="1493947" algn="l" defTabSz="995964" rtl="0" eaLnBrk="1" latinLnBrk="0" hangingPunct="1">
+      <a:defRPr sz="2000" kern="1200">
         <a:solidFill>
           <a:schemeClr val="tx1"/>
         </a:solidFill>
@@ -53,8 +53,8 @@
         <a:cs typeface="+mn-cs"/>
       </a:defRPr>
     </a:lvl4pPr>
-    <a:lvl5pPr marL="1052454" algn="l" defTabSz="526227" rtl="0" eaLnBrk="1" latinLnBrk="0" hangingPunct="1">
-      <a:defRPr sz="1100" kern="1200">
+    <a:lvl5pPr marL="1991929" algn="l" defTabSz="995964" rtl="0" eaLnBrk="1" latinLnBrk="0" hangingPunct="1">
+      <a:defRPr sz="2000" kern="1200">
         <a:solidFill>
           <a:schemeClr val="tx1"/>
         </a:solidFill>
@@ -63,8 +63,8 @@
         <a:cs typeface="+mn-cs"/>
       </a:defRPr>
     </a:lvl5pPr>
-    <a:lvl6pPr marL="1315568" algn="l" defTabSz="526227" rtl="0" eaLnBrk="1" latinLnBrk="0" hangingPunct="1">
-      <a:defRPr sz="1100" kern="1200">
+    <a:lvl6pPr marL="2489911" algn="l" defTabSz="995964" rtl="0" eaLnBrk="1" latinLnBrk="0" hangingPunct="1">
+      <a:defRPr sz="2000" kern="1200">
         <a:solidFill>
           <a:schemeClr val="tx1"/>
         </a:solidFill>
@@ -73,8 +73,8 @@
         <a:cs typeface="+mn-cs"/>
       </a:defRPr>
     </a:lvl6pPr>
-    <a:lvl7pPr marL="1578681" algn="l" defTabSz="526227" rtl="0" eaLnBrk="1" latinLnBrk="0" hangingPunct="1">
-      <a:defRPr sz="1100" kern="1200">
+    <a:lvl7pPr marL="2987893" algn="l" defTabSz="995964" rtl="0" eaLnBrk="1" latinLnBrk="0" hangingPunct="1">
+      <a:defRPr sz="2000" kern="1200">
         <a:solidFill>
           <a:schemeClr val="tx1"/>
         </a:solidFill>
@@ -83,8 +83,8 @@
         <a:cs typeface="+mn-cs"/>
       </a:defRPr>
     </a:lvl7pPr>
-    <a:lvl8pPr marL="1841794" algn="l" defTabSz="526227" rtl="0" eaLnBrk="1" latinLnBrk="0" hangingPunct="1">
-      <a:defRPr sz="1100" kern="1200">
+    <a:lvl8pPr marL="3485876" algn="l" defTabSz="995964" rtl="0" eaLnBrk="1" latinLnBrk="0" hangingPunct="1">
+      <a:defRPr sz="2000" kern="1200">
         <a:solidFill>
           <a:schemeClr val="tx1"/>
         </a:solidFill>
@@ -93,8 +93,8 @@
         <a:cs typeface="+mn-cs"/>
       </a:defRPr>
     </a:lvl8pPr>
-    <a:lvl9pPr marL="2104908" algn="l" defTabSz="526227" rtl="0" eaLnBrk="1" latinLnBrk="0" hangingPunct="1">
-      <a:defRPr sz="1100" kern="1200">
+    <a:lvl9pPr marL="3983858" algn="l" defTabSz="995964" rtl="0" eaLnBrk="1" latinLnBrk="0" hangingPunct="1">
+      <a:defRPr sz="2000" kern="1200">
         <a:solidFill>
           <a:schemeClr val="tx1"/>
         </a:solidFill>
@@ -104,60 +104,7 @@
       </a:defRPr>
     </a:lvl9pPr>
   </p:defaultTextStyle>
-  <p:extLst>
-    <p:ext uri="{EFAFB233-063F-42B5-8137-9DF3F51BA10A}">
-      <p15:sldGuideLst xmlns:p15="http://schemas.microsoft.com/office/powerpoint/2012/main">
-        <p15:guide id="1" orient="horz" pos="1679">
-          <p15:clr>
-            <a:srgbClr val="A4A3A4"/>
-          </p15:clr>
-        </p15:guide>
-        <p15:guide id="2" pos="2382">
-          <p15:clr>
-            <a:srgbClr val="A4A3A4"/>
-          </p15:clr>
-        </p15:guide>
-      </p15:sldGuideLst>
-    </p:ext>
-  </p:extLst>
 </p:presentation>
-</file>
-
-<file path=ppt/changesInfos/changesInfo1.xml><?xml version="1.0" encoding="utf-8"?>
-<pc:chgInfo xmlns:a="http://schemas.openxmlformats.org/drawingml/2006/main" xmlns:r="http://schemas.openxmlformats.org/officeDocument/2006/relationships" xmlns:ac="http://schemas.microsoft.com/office/drawing/2013/main/command" xmlns:pc="http://schemas.microsoft.com/office/powerpoint/2013/main/command">
-  <pc:docChgLst>
-    <pc:chgData name="Andrew Baxter (student)" userId="b45e9002-b033-421d-a3d9-6d42475e9a3f" providerId="ADAL" clId="{8B4BE077-EB2F-483F-8E1C-5C74F5129D44}"/>
-    <pc:docChg chg="custSel modSld">
-      <pc:chgData name="Andrew Baxter (student)" userId="b45e9002-b033-421d-a3d9-6d42475e9a3f" providerId="ADAL" clId="{8B4BE077-EB2F-483F-8E1C-5C74F5129D44}" dt="2019-10-31T11:15:15.690" v="1" actId="478"/>
-      <pc:docMkLst>
-        <pc:docMk/>
-      </pc:docMkLst>
-      <pc:sldChg chg="delSp">
-        <pc:chgData name="Andrew Baxter (student)" userId="b45e9002-b033-421d-a3d9-6d42475e9a3f" providerId="ADAL" clId="{8B4BE077-EB2F-483F-8E1C-5C74F5129D44}" dt="2019-10-31T11:15:15.690" v="1" actId="478"/>
-        <pc:sldMkLst>
-          <pc:docMk/>
-          <pc:sldMk cId="0" sldId="256"/>
-        </pc:sldMkLst>
-        <pc:spChg chg="del">
-          <ac:chgData name="Andrew Baxter (student)" userId="b45e9002-b033-421d-a3d9-6d42475e9a3f" providerId="ADAL" clId="{8B4BE077-EB2F-483F-8E1C-5C74F5129D44}" dt="2019-10-31T11:15:08.546" v="0" actId="478"/>
-          <ac:spMkLst>
-            <pc:docMk/>
-            <pc:sldMk cId="0" sldId="256"/>
-            <ac:spMk id="3" creationId="{00000000-0000-0000-0000-000000000000}"/>
-          </ac:spMkLst>
-        </pc:spChg>
-        <pc:spChg chg="del">
-          <ac:chgData name="Andrew Baxter (student)" userId="b45e9002-b033-421d-a3d9-6d42475e9a3f" providerId="ADAL" clId="{8B4BE077-EB2F-483F-8E1C-5C74F5129D44}" dt="2019-10-31T11:15:15.690" v="1" actId="478"/>
-          <ac:spMkLst>
-            <pc:docMk/>
-            <pc:sldMk cId="0" sldId="256"/>
-            <ac:spMk id="4" creationId="{00000000-0000-0000-0000-000000000000}"/>
-          </ac:spMkLst>
-        </pc:spChg>
-      </pc:sldChg>
-    </pc:docChg>
-  </pc:docChgLst>
-</pc:chgInfo>
 </file>
 
 <file path=ppt/slideLayouts/slideLayout1.xml><?xml version="1.0" encoding="utf-8"?>
@@ -189,8 +136,8 @@
         </p:nvSpPr>
         <p:spPr>
           <a:xfrm>
-            <a:off x="567214" y="1656014"/>
-            <a:ext cx="6428422" cy="1142672"/>
+            <a:off x="802362" y="2349388"/>
+            <a:ext cx="9093439" cy="1621111"/>
           </a:xfrm>
         </p:spPr>
         <p:txBody>
@@ -198,7 +145,7 @@
           <a:lstStyle/>
           <a:p>
             <a:r>
-              <a:rPr lang="en-US"/>
+              <a:rPr lang="en-US" smtClean="0"/>
               <a:t>Click to edit Master title style</a:t>
             </a:r>
             <a:endParaRPr lang="en-GB"/>
@@ -217,8 +164,8 @@
         </p:nvSpPr>
         <p:spPr>
           <a:xfrm>
-            <a:off x="1134428" y="3020801"/>
-            <a:ext cx="5293995" cy="1362322"/>
+            <a:off x="1604725" y="4285615"/>
+            <a:ext cx="7488714" cy="1932728"/>
           </a:xfrm>
         </p:spPr>
         <p:txBody>
@@ -234,7 +181,7 @@
                 </a:solidFill>
               </a:defRPr>
             </a:lvl1pPr>
-            <a:lvl2pPr marL="263113" indent="0" algn="ctr">
+            <a:lvl2pPr marL="497982" indent="0" algn="ctr">
               <a:buNone/>
               <a:defRPr>
                 <a:solidFill>
@@ -244,7 +191,7 @@
                 </a:solidFill>
               </a:defRPr>
             </a:lvl2pPr>
-            <a:lvl3pPr marL="526227" indent="0" algn="ctr">
+            <a:lvl3pPr marL="995964" indent="0" algn="ctr">
               <a:buNone/>
               <a:defRPr>
                 <a:solidFill>
@@ -254,7 +201,7 @@
                 </a:solidFill>
               </a:defRPr>
             </a:lvl3pPr>
-            <a:lvl4pPr marL="789341" indent="0" algn="ctr">
+            <a:lvl4pPr marL="1493947" indent="0" algn="ctr">
               <a:buNone/>
               <a:defRPr>
                 <a:solidFill>
@@ -264,7 +211,7 @@
                 </a:solidFill>
               </a:defRPr>
             </a:lvl4pPr>
-            <a:lvl5pPr marL="1052454" indent="0" algn="ctr">
+            <a:lvl5pPr marL="1991929" indent="0" algn="ctr">
               <a:buNone/>
               <a:defRPr>
                 <a:solidFill>
@@ -274,7 +221,7 @@
                 </a:solidFill>
               </a:defRPr>
             </a:lvl5pPr>
-            <a:lvl6pPr marL="1315568" indent="0" algn="ctr">
+            <a:lvl6pPr marL="2489911" indent="0" algn="ctr">
               <a:buNone/>
               <a:defRPr>
                 <a:solidFill>
@@ -284,7 +231,7 @@
                 </a:solidFill>
               </a:defRPr>
             </a:lvl6pPr>
-            <a:lvl7pPr marL="1578681" indent="0" algn="ctr">
+            <a:lvl7pPr marL="2987893" indent="0" algn="ctr">
               <a:buNone/>
               <a:defRPr>
                 <a:solidFill>
@@ -294,7 +241,7 @@
                 </a:solidFill>
               </a:defRPr>
             </a:lvl7pPr>
-            <a:lvl8pPr marL="1841794" indent="0" algn="ctr">
+            <a:lvl8pPr marL="3485876" indent="0" algn="ctr">
               <a:buNone/>
               <a:defRPr>
                 <a:solidFill>
@@ -304,7 +251,7 @@
                 </a:solidFill>
               </a:defRPr>
             </a:lvl8pPr>
-            <a:lvl9pPr marL="2104908" indent="0" algn="ctr">
+            <a:lvl9pPr marL="3983858" indent="0" algn="ctr">
               <a:buNone/>
               <a:defRPr>
                 <a:solidFill>
@@ -317,7 +264,7 @@
           </a:lstStyle>
           <a:p>
             <a:r>
-              <a:rPr lang="en-US"/>
+              <a:rPr lang="en-US" smtClean="0"/>
               <a:t>Click to edit Master subtitle style</a:t>
             </a:r>
             <a:endParaRPr lang="en-GB"/>
@@ -341,7 +288,7 @@
           <a:p>
             <a:fld id="{6BA5D40C-A8DC-479A-A5D3-E7B4936A184B}" type="datetimeFigureOut">
               <a:rPr lang="en-GB" smtClean="0"/>
-              <a:t>31/10/2019</a:t>
+              <a:t>15/07/2015</a:t>
             </a:fld>
             <a:endParaRPr lang="en-GB"/>
           </a:p>
@@ -435,7 +382,7 @@
           <a:lstStyle/>
           <a:p>
             <a:r>
-              <a:rPr lang="en-US"/>
+              <a:rPr lang="en-US" smtClean="0"/>
               <a:t>Click to edit Master title style</a:t>
             </a:r>
             <a:endParaRPr lang="en-GB"/>
@@ -459,35 +406,35 @@
           <a:p>
             <a:pPr lvl="0"/>
             <a:r>
-              <a:rPr lang="en-US"/>
+              <a:rPr lang="en-US" smtClean="0"/>
               <a:t>Click to edit Master text styles</a:t>
             </a:r>
           </a:p>
           <a:p>
             <a:pPr lvl="1"/>
             <a:r>
-              <a:rPr lang="en-US"/>
+              <a:rPr lang="en-US" smtClean="0"/>
               <a:t>Second level</a:t>
             </a:r>
           </a:p>
           <a:p>
             <a:pPr lvl="2"/>
             <a:r>
-              <a:rPr lang="en-US"/>
+              <a:rPr lang="en-US" smtClean="0"/>
               <a:t>Third level</a:t>
             </a:r>
           </a:p>
           <a:p>
             <a:pPr lvl="3"/>
             <a:r>
-              <a:rPr lang="en-US"/>
+              <a:rPr lang="en-US" smtClean="0"/>
               <a:t>Fourth level</a:t>
             </a:r>
           </a:p>
           <a:p>
             <a:pPr lvl="4"/>
             <a:r>
-              <a:rPr lang="en-US"/>
+              <a:rPr lang="en-US" smtClean="0"/>
               <a:t>Fifth level</a:t>
             </a:r>
             <a:endParaRPr lang="en-GB"/>
@@ -511,7 +458,7 @@
           <a:p>
             <a:fld id="{6BA5D40C-A8DC-479A-A5D3-E7B4936A184B}" type="datetimeFigureOut">
               <a:rPr lang="en-GB" smtClean="0"/>
-              <a:t>31/10/2019</a:t>
+              <a:t>15/07/2015</a:t>
             </a:fld>
             <a:endParaRPr lang="en-GB"/>
           </a:p>
@@ -601,8 +548,8 @@
         </p:nvSpPr>
         <p:spPr>
           <a:xfrm>
-            <a:off x="5939989" y="213483"/>
-            <a:ext cx="1843445" cy="4548477"/>
+            <a:off x="8402515" y="302867"/>
+            <a:ext cx="2607678" cy="6452932"/>
           </a:xfrm>
         </p:spPr>
         <p:txBody>
@@ -610,7 +557,7 @@
           <a:lstStyle/>
           <a:p>
             <a:r>
-              <a:rPr lang="en-US"/>
+              <a:rPr lang="en-US" smtClean="0"/>
               <a:t>Click to edit Master title style</a:t>
             </a:r>
             <a:endParaRPr lang="en-GB"/>
@@ -629,8 +576,8 @@
         </p:nvSpPr>
         <p:spPr>
           <a:xfrm>
-            <a:off x="409657" y="213483"/>
-            <a:ext cx="5404287" cy="4548477"/>
+            <a:off x="579485" y="302867"/>
+            <a:ext cx="7644730" cy="6452932"/>
           </a:xfrm>
         </p:spPr>
         <p:txBody>
@@ -639,35 +586,35 @@
           <a:p>
             <a:pPr lvl="0"/>
             <a:r>
-              <a:rPr lang="en-US"/>
+              <a:rPr lang="en-US" smtClean="0"/>
               <a:t>Click to edit Master text styles</a:t>
             </a:r>
           </a:p>
           <a:p>
             <a:pPr lvl="1"/>
             <a:r>
-              <a:rPr lang="en-US"/>
+              <a:rPr lang="en-US" smtClean="0"/>
               <a:t>Second level</a:t>
             </a:r>
           </a:p>
           <a:p>
             <a:pPr lvl="2"/>
             <a:r>
-              <a:rPr lang="en-US"/>
+              <a:rPr lang="en-US" smtClean="0"/>
               <a:t>Third level</a:t>
             </a:r>
           </a:p>
           <a:p>
             <a:pPr lvl="3"/>
             <a:r>
-              <a:rPr lang="en-US"/>
+              <a:rPr lang="en-US" smtClean="0"/>
               <a:t>Fourth level</a:t>
             </a:r>
           </a:p>
           <a:p>
             <a:pPr lvl="4"/>
             <a:r>
-              <a:rPr lang="en-US"/>
+              <a:rPr lang="en-US" smtClean="0"/>
               <a:t>Fifth level</a:t>
             </a:r>
             <a:endParaRPr lang="en-GB"/>
@@ -691,7 +638,7 @@
           <a:p>
             <a:fld id="{6BA5D40C-A8DC-479A-A5D3-E7B4936A184B}" type="datetimeFigureOut">
               <a:rPr lang="en-GB" smtClean="0"/>
-              <a:t>31/10/2019</a:t>
+              <a:t>15/07/2015</a:t>
             </a:fld>
             <a:endParaRPr lang="en-GB"/>
           </a:p>
@@ -785,7 +732,7 @@
           <a:lstStyle/>
           <a:p>
             <a:r>
-              <a:rPr lang="en-US"/>
+              <a:rPr lang="en-US" smtClean="0"/>
               <a:t>Click to edit Master title style</a:t>
             </a:r>
             <a:endParaRPr lang="en-GB"/>
@@ -809,35 +756,35 @@
           <a:p>
             <a:pPr lvl="0"/>
             <a:r>
-              <a:rPr lang="en-US"/>
+              <a:rPr lang="en-US" smtClean="0"/>
               <a:t>Click to edit Master text styles</a:t>
             </a:r>
           </a:p>
           <a:p>
             <a:pPr lvl="1"/>
             <a:r>
-              <a:rPr lang="en-US"/>
+              <a:rPr lang="en-US" smtClean="0"/>
               <a:t>Second level</a:t>
             </a:r>
           </a:p>
           <a:p>
             <a:pPr lvl="2"/>
             <a:r>
-              <a:rPr lang="en-US"/>
+              <a:rPr lang="en-US" smtClean="0"/>
               <a:t>Third level</a:t>
             </a:r>
           </a:p>
           <a:p>
             <a:pPr lvl="3"/>
             <a:r>
-              <a:rPr lang="en-US"/>
+              <a:rPr lang="en-US" smtClean="0"/>
               <a:t>Fourth level</a:t>
             </a:r>
           </a:p>
           <a:p>
             <a:pPr lvl="4"/>
             <a:r>
-              <a:rPr lang="en-US"/>
+              <a:rPr lang="en-US" smtClean="0"/>
               <a:t>Fifth level</a:t>
             </a:r>
             <a:endParaRPr lang="en-GB"/>
@@ -861,7 +808,7 @@
           <a:p>
             <a:fld id="{6BA5D40C-A8DC-479A-A5D3-E7B4936A184B}" type="datetimeFigureOut">
               <a:rPr lang="en-GB" smtClean="0"/>
-              <a:t>31/10/2019</a:t>
+              <a:t>15/07/2015</a:t>
             </a:fld>
             <a:endParaRPr lang="en-GB"/>
           </a:p>
@@ -951,20 +898,20 @@
         </p:nvSpPr>
         <p:spPr>
           <a:xfrm>
-            <a:off x="597414" y="3425550"/>
-            <a:ext cx="6428422" cy="1058761"/>
+            <a:off x="845081" y="4859833"/>
+            <a:ext cx="9093439" cy="1502066"/>
           </a:xfrm>
         </p:spPr>
         <p:txBody>
           <a:bodyPr anchor="t"/>
           <a:lstStyle>
             <a:lvl1pPr algn="l">
-              <a:defRPr sz="2300" b="1" cap="all"/>
+              <a:defRPr sz="4400" b="1" cap="all"/>
             </a:lvl1pPr>
           </a:lstStyle>
           <a:p>
             <a:r>
-              <a:rPr lang="en-US"/>
+              <a:rPr lang="en-US" smtClean="0"/>
               <a:t>Click to edit Master title style</a:t>
             </a:r>
             <a:endParaRPr lang="en-GB"/>
@@ -983,8 +930,8 @@
         </p:nvSpPr>
         <p:spPr>
           <a:xfrm>
-            <a:off x="597414" y="2259433"/>
-            <a:ext cx="6428422" cy="1166118"/>
+            <a:off x="845081" y="3205460"/>
+            <a:ext cx="9093439" cy="1654373"/>
           </a:xfrm>
         </p:spPr>
         <p:txBody>
@@ -992,7 +939,7 @@
           <a:lstStyle>
             <a:lvl1pPr marL="0" indent="0">
               <a:buNone/>
-              <a:defRPr sz="1200">
+              <a:defRPr sz="2200">
                 <a:solidFill>
                   <a:schemeClr val="tx1">
                     <a:tint val="75000"/>
@@ -1000,9 +947,9 @@
                 </a:solidFill>
               </a:defRPr>
             </a:lvl1pPr>
-            <a:lvl2pPr marL="263113" indent="0">
-              <a:buNone/>
-              <a:defRPr sz="1100">
+            <a:lvl2pPr marL="497982" indent="0">
+              <a:buNone/>
+              <a:defRPr sz="2000">
                 <a:solidFill>
                   <a:schemeClr val="tx1">
                     <a:tint val="75000"/>
@@ -1010,9 +957,9 @@
                 </a:solidFill>
               </a:defRPr>
             </a:lvl2pPr>
-            <a:lvl3pPr marL="526227" indent="0">
-              <a:buNone/>
-              <a:defRPr sz="900">
+            <a:lvl3pPr marL="995964" indent="0">
+              <a:buNone/>
+              <a:defRPr sz="1700">
                 <a:solidFill>
                   <a:schemeClr val="tx1">
                     <a:tint val="75000"/>
@@ -1020,9 +967,9 @@
                 </a:solidFill>
               </a:defRPr>
             </a:lvl3pPr>
-            <a:lvl4pPr marL="789341" indent="0">
-              <a:buNone/>
-              <a:defRPr sz="800">
+            <a:lvl4pPr marL="1493947" indent="0">
+              <a:buNone/>
+              <a:defRPr sz="1500">
                 <a:solidFill>
                   <a:schemeClr val="tx1">
                     <a:tint val="75000"/>
@@ -1030,9 +977,9 @@
                 </a:solidFill>
               </a:defRPr>
             </a:lvl4pPr>
-            <a:lvl5pPr marL="1052454" indent="0">
-              <a:buNone/>
-              <a:defRPr sz="800">
+            <a:lvl5pPr marL="1991929" indent="0">
+              <a:buNone/>
+              <a:defRPr sz="1500">
                 <a:solidFill>
                   <a:schemeClr val="tx1">
                     <a:tint val="75000"/>
@@ -1040,9 +987,9 @@
                 </a:solidFill>
               </a:defRPr>
             </a:lvl5pPr>
-            <a:lvl6pPr marL="1315568" indent="0">
-              <a:buNone/>
-              <a:defRPr sz="800">
+            <a:lvl6pPr marL="2489911" indent="0">
+              <a:buNone/>
+              <a:defRPr sz="1500">
                 <a:solidFill>
                   <a:schemeClr val="tx1">
                     <a:tint val="75000"/>
@@ -1050,9 +997,9 @@
                 </a:solidFill>
               </a:defRPr>
             </a:lvl6pPr>
-            <a:lvl7pPr marL="1578681" indent="0">
-              <a:buNone/>
-              <a:defRPr sz="800">
+            <a:lvl7pPr marL="2987893" indent="0">
+              <a:buNone/>
+              <a:defRPr sz="1500">
                 <a:solidFill>
                   <a:schemeClr val="tx1">
                     <a:tint val="75000"/>
@@ -1060,9 +1007,9 @@
                 </a:solidFill>
               </a:defRPr>
             </a:lvl7pPr>
-            <a:lvl8pPr marL="1841794" indent="0">
-              <a:buNone/>
-              <a:defRPr sz="800">
+            <a:lvl8pPr marL="3485876" indent="0">
+              <a:buNone/>
+              <a:defRPr sz="1500">
                 <a:solidFill>
                   <a:schemeClr val="tx1">
                     <a:tint val="75000"/>
@@ -1070,9 +1017,9 @@
                 </a:solidFill>
               </a:defRPr>
             </a:lvl8pPr>
-            <a:lvl9pPr marL="2104908" indent="0">
-              <a:buNone/>
-              <a:defRPr sz="800">
+            <a:lvl9pPr marL="3983858" indent="0">
+              <a:buNone/>
+              <a:defRPr sz="1500">
                 <a:solidFill>
                   <a:schemeClr val="tx1">
                     <a:tint val="75000"/>
@@ -1084,7 +1031,7 @@
           <a:p>
             <a:pPr lvl="0"/>
             <a:r>
-              <a:rPr lang="en-US"/>
+              <a:rPr lang="en-US" smtClean="0"/>
               <a:t>Click to edit Master text styles</a:t>
             </a:r>
           </a:p>
@@ -1107,7 +1054,7 @@
           <a:p>
             <a:fld id="{6BA5D40C-A8DC-479A-A5D3-E7B4936A184B}" type="datetimeFigureOut">
               <a:rPr lang="en-GB" smtClean="0"/>
-              <a:t>31/10/2019</a:t>
+              <a:t>15/07/2015</a:t>
             </a:fld>
             <a:endParaRPr lang="en-GB"/>
           </a:p>
@@ -1201,7 +1148,7 @@
           <a:lstStyle/>
           <a:p>
             <a:r>
-              <a:rPr lang="en-US"/>
+              <a:rPr lang="en-US" smtClean="0"/>
               <a:t>Click to edit Master title style</a:t>
             </a:r>
             <a:endParaRPr lang="en-GB"/>
@@ -1220,73 +1167,73 @@
         </p:nvSpPr>
         <p:spPr>
           <a:xfrm>
-            <a:off x="409656" y="1243861"/>
-            <a:ext cx="3623866" cy="3518098"/>
+            <a:off x="579486" y="1764667"/>
+            <a:ext cx="5126203" cy="4991131"/>
           </a:xfrm>
         </p:spPr>
         <p:txBody>
           <a:bodyPr/>
           <a:lstStyle>
             <a:lvl1pPr>
-              <a:defRPr sz="1600"/>
+              <a:defRPr sz="3000"/>
             </a:lvl1pPr>
             <a:lvl2pPr>
-              <a:defRPr sz="1400"/>
+              <a:defRPr sz="2600"/>
             </a:lvl2pPr>
             <a:lvl3pPr>
-              <a:defRPr sz="1200"/>
+              <a:defRPr sz="2200"/>
             </a:lvl3pPr>
             <a:lvl4pPr>
-              <a:defRPr sz="1100"/>
+              <a:defRPr sz="2000"/>
             </a:lvl4pPr>
             <a:lvl5pPr>
-              <a:defRPr sz="1100"/>
+              <a:defRPr sz="2000"/>
             </a:lvl5pPr>
             <a:lvl6pPr>
-              <a:defRPr sz="1100"/>
+              <a:defRPr sz="2000"/>
             </a:lvl6pPr>
             <a:lvl7pPr>
-              <a:defRPr sz="1100"/>
+              <a:defRPr sz="2000"/>
             </a:lvl7pPr>
             <a:lvl8pPr>
-              <a:defRPr sz="1100"/>
+              <a:defRPr sz="2000"/>
             </a:lvl8pPr>
             <a:lvl9pPr>
-              <a:defRPr sz="1100"/>
+              <a:defRPr sz="2000"/>
             </a:lvl9pPr>
           </a:lstStyle>
           <a:p>
             <a:pPr lvl="0"/>
             <a:r>
-              <a:rPr lang="en-US"/>
+              <a:rPr lang="en-US" smtClean="0"/>
               <a:t>Click to edit Master text styles</a:t>
             </a:r>
           </a:p>
           <a:p>
             <a:pPr lvl="1"/>
             <a:r>
-              <a:rPr lang="en-US"/>
+              <a:rPr lang="en-US" smtClean="0"/>
               <a:t>Second level</a:t>
             </a:r>
           </a:p>
           <a:p>
             <a:pPr lvl="2"/>
             <a:r>
-              <a:rPr lang="en-US"/>
+              <a:rPr lang="en-US" smtClean="0"/>
               <a:t>Third level</a:t>
             </a:r>
           </a:p>
           <a:p>
             <a:pPr lvl="3"/>
             <a:r>
-              <a:rPr lang="en-US"/>
+              <a:rPr lang="en-US" smtClean="0"/>
               <a:t>Fourth level</a:t>
             </a:r>
           </a:p>
           <a:p>
             <a:pPr lvl="4"/>
             <a:r>
-              <a:rPr lang="en-US"/>
+              <a:rPr lang="en-US" smtClean="0"/>
               <a:t>Fifth level</a:t>
             </a:r>
             <a:endParaRPr lang="en-GB"/>
@@ -1305,73 +1252,73 @@
         </p:nvSpPr>
         <p:spPr>
           <a:xfrm>
-            <a:off x="4159570" y="1243861"/>
-            <a:ext cx="3623866" cy="3518098"/>
+            <a:off x="5883991" y="1764667"/>
+            <a:ext cx="5126203" cy="4991131"/>
           </a:xfrm>
         </p:spPr>
         <p:txBody>
           <a:bodyPr/>
           <a:lstStyle>
             <a:lvl1pPr>
-              <a:defRPr sz="1600"/>
+              <a:defRPr sz="3000"/>
             </a:lvl1pPr>
             <a:lvl2pPr>
-              <a:defRPr sz="1400"/>
+              <a:defRPr sz="2600"/>
             </a:lvl2pPr>
             <a:lvl3pPr>
-              <a:defRPr sz="1200"/>
+              <a:defRPr sz="2200"/>
             </a:lvl3pPr>
             <a:lvl4pPr>
-              <a:defRPr sz="1100"/>
+              <a:defRPr sz="2000"/>
             </a:lvl4pPr>
             <a:lvl5pPr>
-              <a:defRPr sz="1100"/>
+              <a:defRPr sz="2000"/>
             </a:lvl5pPr>
             <a:lvl6pPr>
-              <a:defRPr sz="1100"/>
+              <a:defRPr sz="2000"/>
             </a:lvl6pPr>
             <a:lvl7pPr>
-              <a:defRPr sz="1100"/>
+              <a:defRPr sz="2000"/>
             </a:lvl7pPr>
             <a:lvl8pPr>
-              <a:defRPr sz="1100"/>
+              <a:defRPr sz="2000"/>
             </a:lvl8pPr>
             <a:lvl9pPr>
-              <a:defRPr sz="1100"/>
+              <a:defRPr sz="2000"/>
             </a:lvl9pPr>
           </a:lstStyle>
           <a:p>
             <a:pPr lvl="0"/>
             <a:r>
-              <a:rPr lang="en-US"/>
+              <a:rPr lang="en-US" smtClean="0"/>
               <a:t>Click to edit Master text styles</a:t>
             </a:r>
           </a:p>
           <a:p>
             <a:pPr lvl="1"/>
             <a:r>
-              <a:rPr lang="en-US"/>
+              <a:rPr lang="en-US" smtClean="0"/>
               <a:t>Second level</a:t>
             </a:r>
           </a:p>
           <a:p>
             <a:pPr lvl="2"/>
             <a:r>
-              <a:rPr lang="en-US"/>
+              <a:rPr lang="en-US" smtClean="0"/>
               <a:t>Third level</a:t>
             </a:r>
           </a:p>
           <a:p>
             <a:pPr lvl="3"/>
             <a:r>
-              <a:rPr lang="en-US"/>
+              <a:rPr lang="en-US" smtClean="0"/>
               <a:t>Fourth level</a:t>
             </a:r>
           </a:p>
           <a:p>
             <a:pPr lvl="4"/>
             <a:r>
-              <a:rPr lang="en-US"/>
+              <a:rPr lang="en-US" smtClean="0"/>
               <a:t>Fifth level</a:t>
             </a:r>
             <a:endParaRPr lang="en-GB"/>
@@ -1395,7 +1342,7 @@
           <a:p>
             <a:fld id="{6BA5D40C-A8DC-479A-A5D3-E7B4936A184B}" type="datetimeFigureOut">
               <a:rPr lang="en-GB" smtClean="0"/>
-              <a:t>31/10/2019</a:t>
+              <a:t>15/07/2015</a:t>
             </a:fld>
             <a:endParaRPr lang="en-GB"/>
           </a:p>
@@ -1485,8 +1432,8 @@
         </p:nvSpPr>
         <p:spPr>
           <a:xfrm>
-            <a:off x="378143" y="213480"/>
-            <a:ext cx="6806565" cy="888471"/>
+            <a:off x="534908" y="302865"/>
+            <a:ext cx="9628347" cy="1260475"/>
           </a:xfrm>
         </p:spPr>
         <p:txBody>
@@ -1498,7 +1445,7 @@
           </a:lstStyle>
           <a:p>
             <a:r>
-              <a:rPr lang="en-US"/>
+              <a:rPr lang="en-US" smtClean="0"/>
               <a:t>Click to edit Master title style</a:t>
             </a:r>
             <a:endParaRPr lang="en-GB"/>
@@ -1517,8 +1464,8 @@
         </p:nvSpPr>
         <p:spPr>
           <a:xfrm>
-            <a:off x="378145" y="1193267"/>
-            <a:ext cx="3341572" cy="497296"/>
+            <a:off x="534909" y="1692889"/>
+            <a:ext cx="4726880" cy="705515"/>
           </a:xfrm>
         </p:spPr>
         <p:txBody>
@@ -1526,45 +1473,45 @@
           <a:lstStyle>
             <a:lvl1pPr marL="0" indent="0">
               <a:buNone/>
-              <a:defRPr sz="1400" b="1"/>
+              <a:defRPr sz="2600" b="1"/>
             </a:lvl1pPr>
-            <a:lvl2pPr marL="263113" indent="0">
-              <a:buNone/>
-              <a:defRPr sz="1200" b="1"/>
+            <a:lvl2pPr marL="497982" indent="0">
+              <a:buNone/>
+              <a:defRPr sz="2200" b="1"/>
             </a:lvl2pPr>
-            <a:lvl3pPr marL="526227" indent="0">
-              <a:buNone/>
-              <a:defRPr sz="1100" b="1"/>
+            <a:lvl3pPr marL="995964" indent="0">
+              <a:buNone/>
+              <a:defRPr sz="2000" b="1"/>
             </a:lvl3pPr>
-            <a:lvl4pPr marL="789341" indent="0">
-              <a:buNone/>
-              <a:defRPr sz="900" b="1"/>
+            <a:lvl4pPr marL="1493947" indent="0">
+              <a:buNone/>
+              <a:defRPr sz="1700" b="1"/>
             </a:lvl4pPr>
-            <a:lvl5pPr marL="1052454" indent="0">
-              <a:buNone/>
-              <a:defRPr sz="900" b="1"/>
+            <a:lvl5pPr marL="1991929" indent="0">
+              <a:buNone/>
+              <a:defRPr sz="1700" b="1"/>
             </a:lvl5pPr>
-            <a:lvl6pPr marL="1315568" indent="0">
-              <a:buNone/>
-              <a:defRPr sz="900" b="1"/>
+            <a:lvl6pPr marL="2489911" indent="0">
+              <a:buNone/>
+              <a:defRPr sz="1700" b="1"/>
             </a:lvl6pPr>
-            <a:lvl7pPr marL="1578681" indent="0">
-              <a:buNone/>
-              <a:defRPr sz="900" b="1"/>
+            <a:lvl7pPr marL="2987893" indent="0">
+              <a:buNone/>
+              <a:defRPr sz="1700" b="1"/>
             </a:lvl7pPr>
-            <a:lvl8pPr marL="1841794" indent="0">
-              <a:buNone/>
-              <a:defRPr sz="900" b="1"/>
+            <a:lvl8pPr marL="3485876" indent="0">
+              <a:buNone/>
+              <a:defRPr sz="1700" b="1"/>
             </a:lvl8pPr>
-            <a:lvl9pPr marL="2104908" indent="0">
-              <a:buNone/>
-              <a:defRPr sz="900" b="1"/>
+            <a:lvl9pPr marL="3983858" indent="0">
+              <a:buNone/>
+              <a:defRPr sz="1700" b="1"/>
             </a:lvl9pPr>
           </a:lstStyle>
           <a:p>
             <a:pPr lvl="0"/>
             <a:r>
-              <a:rPr lang="en-US"/>
+              <a:rPr lang="en-US" smtClean="0"/>
               <a:t>Click to edit Master text styles</a:t>
             </a:r>
           </a:p>
@@ -1582,73 +1529,73 @@
         </p:nvSpPr>
         <p:spPr>
           <a:xfrm>
-            <a:off x="378145" y="1690563"/>
-            <a:ext cx="3341572" cy="3071394"/>
+            <a:off x="534909" y="2398404"/>
+            <a:ext cx="4726880" cy="4357393"/>
           </a:xfrm>
         </p:spPr>
         <p:txBody>
           <a:bodyPr/>
           <a:lstStyle>
             <a:lvl1pPr>
-              <a:defRPr sz="1400"/>
+              <a:defRPr sz="2600"/>
             </a:lvl1pPr>
             <a:lvl2pPr>
-              <a:defRPr sz="1200"/>
+              <a:defRPr sz="2200"/>
             </a:lvl2pPr>
             <a:lvl3pPr>
-              <a:defRPr sz="1100"/>
+              <a:defRPr sz="2000"/>
             </a:lvl3pPr>
             <a:lvl4pPr>
-              <a:defRPr sz="900"/>
+              <a:defRPr sz="1700"/>
             </a:lvl4pPr>
             <a:lvl5pPr>
-              <a:defRPr sz="900"/>
+              <a:defRPr sz="1700"/>
             </a:lvl5pPr>
             <a:lvl6pPr>
-              <a:defRPr sz="900"/>
+              <a:defRPr sz="1700"/>
             </a:lvl6pPr>
             <a:lvl7pPr>
-              <a:defRPr sz="900"/>
+              <a:defRPr sz="1700"/>
             </a:lvl7pPr>
             <a:lvl8pPr>
-              <a:defRPr sz="900"/>
+              <a:defRPr sz="1700"/>
             </a:lvl8pPr>
             <a:lvl9pPr>
-              <a:defRPr sz="900"/>
+              <a:defRPr sz="1700"/>
             </a:lvl9pPr>
           </a:lstStyle>
           <a:p>
             <a:pPr lvl="0"/>
             <a:r>
-              <a:rPr lang="en-US"/>
+              <a:rPr lang="en-US" smtClean="0"/>
               <a:t>Click to edit Master text styles</a:t>
             </a:r>
           </a:p>
           <a:p>
             <a:pPr lvl="1"/>
             <a:r>
-              <a:rPr lang="en-US"/>
+              <a:rPr lang="en-US" smtClean="0"/>
               <a:t>Second level</a:t>
             </a:r>
           </a:p>
           <a:p>
             <a:pPr lvl="2"/>
             <a:r>
-              <a:rPr lang="en-US"/>
+              <a:rPr lang="en-US" smtClean="0"/>
               <a:t>Third level</a:t>
             </a:r>
           </a:p>
           <a:p>
             <a:pPr lvl="3"/>
             <a:r>
-              <a:rPr lang="en-US"/>
+              <a:rPr lang="en-US" smtClean="0"/>
               <a:t>Fourth level</a:t>
             </a:r>
           </a:p>
           <a:p>
             <a:pPr lvl="4"/>
             <a:r>
-              <a:rPr lang="en-US"/>
+              <a:rPr lang="en-US" smtClean="0"/>
               <a:t>Fifth level</a:t>
             </a:r>
             <a:endParaRPr lang="en-GB"/>
@@ -1667,8 +1614,8 @@
         </p:nvSpPr>
         <p:spPr>
           <a:xfrm>
-            <a:off x="3841824" y="1193267"/>
-            <a:ext cx="3342886" cy="497296"/>
+            <a:off x="5434519" y="1692889"/>
+            <a:ext cx="4728738" cy="705515"/>
           </a:xfrm>
         </p:spPr>
         <p:txBody>
@@ -1676,45 +1623,45 @@
           <a:lstStyle>
             <a:lvl1pPr marL="0" indent="0">
               <a:buNone/>
-              <a:defRPr sz="1400" b="1"/>
+              <a:defRPr sz="2600" b="1"/>
             </a:lvl1pPr>
-            <a:lvl2pPr marL="263113" indent="0">
-              <a:buNone/>
-              <a:defRPr sz="1200" b="1"/>
+            <a:lvl2pPr marL="497982" indent="0">
+              <a:buNone/>
+              <a:defRPr sz="2200" b="1"/>
             </a:lvl2pPr>
-            <a:lvl3pPr marL="526227" indent="0">
-              <a:buNone/>
-              <a:defRPr sz="1100" b="1"/>
+            <a:lvl3pPr marL="995964" indent="0">
+              <a:buNone/>
+              <a:defRPr sz="2000" b="1"/>
             </a:lvl3pPr>
-            <a:lvl4pPr marL="789341" indent="0">
-              <a:buNone/>
-              <a:defRPr sz="900" b="1"/>
+            <a:lvl4pPr marL="1493947" indent="0">
+              <a:buNone/>
+              <a:defRPr sz="1700" b="1"/>
             </a:lvl4pPr>
-            <a:lvl5pPr marL="1052454" indent="0">
-              <a:buNone/>
-              <a:defRPr sz="900" b="1"/>
+            <a:lvl5pPr marL="1991929" indent="0">
+              <a:buNone/>
+              <a:defRPr sz="1700" b="1"/>
             </a:lvl5pPr>
-            <a:lvl6pPr marL="1315568" indent="0">
-              <a:buNone/>
-              <a:defRPr sz="900" b="1"/>
+            <a:lvl6pPr marL="2489911" indent="0">
+              <a:buNone/>
+              <a:defRPr sz="1700" b="1"/>
             </a:lvl6pPr>
-            <a:lvl7pPr marL="1578681" indent="0">
-              <a:buNone/>
-              <a:defRPr sz="900" b="1"/>
+            <a:lvl7pPr marL="2987893" indent="0">
+              <a:buNone/>
+              <a:defRPr sz="1700" b="1"/>
             </a:lvl7pPr>
-            <a:lvl8pPr marL="1841794" indent="0">
-              <a:buNone/>
-              <a:defRPr sz="900" b="1"/>
+            <a:lvl8pPr marL="3485876" indent="0">
+              <a:buNone/>
+              <a:defRPr sz="1700" b="1"/>
             </a:lvl8pPr>
-            <a:lvl9pPr marL="2104908" indent="0">
-              <a:buNone/>
-              <a:defRPr sz="900" b="1"/>
+            <a:lvl9pPr marL="3983858" indent="0">
+              <a:buNone/>
+              <a:defRPr sz="1700" b="1"/>
             </a:lvl9pPr>
           </a:lstStyle>
           <a:p>
             <a:pPr lvl="0"/>
             <a:r>
-              <a:rPr lang="en-US"/>
+              <a:rPr lang="en-US" smtClean="0"/>
               <a:t>Click to edit Master text styles</a:t>
             </a:r>
           </a:p>
@@ -1732,73 +1679,73 @@
         </p:nvSpPr>
         <p:spPr>
           <a:xfrm>
-            <a:off x="3841824" y="1690563"/>
-            <a:ext cx="3342886" cy="3071394"/>
+            <a:off x="5434519" y="2398404"/>
+            <a:ext cx="4728738" cy="4357393"/>
           </a:xfrm>
         </p:spPr>
         <p:txBody>
           <a:bodyPr/>
           <a:lstStyle>
             <a:lvl1pPr>
-              <a:defRPr sz="1400"/>
+              <a:defRPr sz="2600"/>
             </a:lvl1pPr>
             <a:lvl2pPr>
-              <a:defRPr sz="1200"/>
+              <a:defRPr sz="2200"/>
             </a:lvl2pPr>
             <a:lvl3pPr>
-              <a:defRPr sz="1100"/>
+              <a:defRPr sz="2000"/>
             </a:lvl3pPr>
             <a:lvl4pPr>
-              <a:defRPr sz="900"/>
+              <a:defRPr sz="1700"/>
             </a:lvl4pPr>
             <a:lvl5pPr>
-              <a:defRPr sz="900"/>
+              <a:defRPr sz="1700"/>
             </a:lvl5pPr>
             <a:lvl6pPr>
-              <a:defRPr sz="900"/>
+              <a:defRPr sz="1700"/>
             </a:lvl6pPr>
             <a:lvl7pPr>
-              <a:defRPr sz="900"/>
+              <a:defRPr sz="1700"/>
             </a:lvl7pPr>
             <a:lvl8pPr>
-              <a:defRPr sz="900"/>
+              <a:defRPr sz="1700"/>
             </a:lvl8pPr>
             <a:lvl9pPr>
-              <a:defRPr sz="900"/>
+              <a:defRPr sz="1700"/>
             </a:lvl9pPr>
           </a:lstStyle>
           <a:p>
             <a:pPr lvl="0"/>
             <a:r>
-              <a:rPr lang="en-US"/>
+              <a:rPr lang="en-US" smtClean="0"/>
               <a:t>Click to edit Master text styles</a:t>
             </a:r>
           </a:p>
           <a:p>
             <a:pPr lvl="1"/>
             <a:r>
-              <a:rPr lang="en-US"/>
+              <a:rPr lang="en-US" smtClean="0"/>
               <a:t>Second level</a:t>
             </a:r>
           </a:p>
           <a:p>
             <a:pPr lvl="2"/>
             <a:r>
-              <a:rPr lang="en-US"/>
+              <a:rPr lang="en-US" smtClean="0"/>
               <a:t>Third level</a:t>
             </a:r>
           </a:p>
           <a:p>
             <a:pPr lvl="3"/>
             <a:r>
-              <a:rPr lang="en-US"/>
+              <a:rPr lang="en-US" smtClean="0"/>
               <a:t>Fourth level</a:t>
             </a:r>
           </a:p>
           <a:p>
             <a:pPr lvl="4"/>
             <a:r>
-              <a:rPr lang="en-US"/>
+              <a:rPr lang="en-US" smtClean="0"/>
               <a:t>Fifth level</a:t>
             </a:r>
             <a:endParaRPr lang="en-GB"/>
@@ -1822,7 +1769,7 @@
           <a:p>
             <a:fld id="{6BA5D40C-A8DC-479A-A5D3-E7B4936A184B}" type="datetimeFigureOut">
               <a:rPr lang="en-GB" smtClean="0"/>
-              <a:t>31/10/2019</a:t>
+              <a:t>15/07/2015</a:t>
             </a:fld>
             <a:endParaRPr lang="en-GB"/>
           </a:p>
@@ -1916,7 +1863,7 @@
           <a:lstStyle/>
           <a:p>
             <a:r>
-              <a:rPr lang="en-US"/>
+              <a:rPr lang="en-US" smtClean="0"/>
               <a:t>Click to edit Master title style</a:t>
             </a:r>
             <a:endParaRPr lang="en-GB"/>
@@ -1940,7 +1887,7 @@
           <a:p>
             <a:fld id="{6BA5D40C-A8DC-479A-A5D3-E7B4936A184B}" type="datetimeFigureOut">
               <a:rPr lang="en-GB" smtClean="0"/>
-              <a:t>31/10/2019</a:t>
+              <a:t>15/07/2015</a:t>
             </a:fld>
             <a:endParaRPr lang="en-GB"/>
           </a:p>
@@ -2035,7 +1982,7 @@
           <a:p>
             <a:fld id="{6BA5D40C-A8DC-479A-A5D3-E7B4936A184B}" type="datetimeFigureOut">
               <a:rPr lang="en-GB" smtClean="0"/>
-              <a:t>31/10/2019</a:t>
+              <a:t>15/07/2015</a:t>
             </a:fld>
             <a:endParaRPr lang="en-GB"/>
           </a:p>
@@ -2125,20 +2072,20 @@
         </p:nvSpPr>
         <p:spPr>
           <a:xfrm>
-            <a:off x="378145" y="212246"/>
-            <a:ext cx="2488126" cy="903279"/>
+            <a:off x="534909" y="301113"/>
+            <a:ext cx="3519622" cy="1281483"/>
           </a:xfrm>
         </p:spPr>
         <p:txBody>
           <a:bodyPr anchor="b"/>
           <a:lstStyle>
             <a:lvl1pPr algn="l">
-              <a:defRPr sz="1200" b="1"/>
+              <a:defRPr sz="2200" b="1"/>
             </a:lvl1pPr>
           </a:lstStyle>
           <a:p>
             <a:r>
-              <a:rPr lang="en-US"/>
+              <a:rPr lang="en-US" smtClean="0"/>
               <a:t>Click to edit Master title style</a:t>
             </a:r>
             <a:endParaRPr lang="en-GB"/>
@@ -2157,73 +2104,73 @@
         </p:nvSpPr>
         <p:spPr>
           <a:xfrm>
-            <a:off x="2956865" y="212248"/>
-            <a:ext cx="4227843" cy="4549712"/>
+            <a:off x="4182686" y="301116"/>
+            <a:ext cx="5980569" cy="6454683"/>
           </a:xfrm>
         </p:spPr>
         <p:txBody>
           <a:bodyPr/>
           <a:lstStyle>
             <a:lvl1pPr>
-              <a:defRPr sz="1800"/>
+              <a:defRPr sz="3500"/>
             </a:lvl1pPr>
             <a:lvl2pPr>
-              <a:defRPr sz="1600"/>
+              <a:defRPr sz="3000"/>
             </a:lvl2pPr>
             <a:lvl3pPr>
-              <a:defRPr sz="1400"/>
+              <a:defRPr sz="2600"/>
             </a:lvl3pPr>
             <a:lvl4pPr>
-              <a:defRPr sz="1200"/>
+              <a:defRPr sz="2200"/>
             </a:lvl4pPr>
             <a:lvl5pPr>
-              <a:defRPr sz="1200"/>
+              <a:defRPr sz="2200"/>
             </a:lvl5pPr>
             <a:lvl6pPr>
-              <a:defRPr sz="1200"/>
+              <a:defRPr sz="2200"/>
             </a:lvl6pPr>
             <a:lvl7pPr>
-              <a:defRPr sz="1200"/>
+              <a:defRPr sz="2200"/>
             </a:lvl7pPr>
             <a:lvl8pPr>
-              <a:defRPr sz="1200"/>
+              <a:defRPr sz="2200"/>
             </a:lvl8pPr>
             <a:lvl9pPr>
-              <a:defRPr sz="1200"/>
+              <a:defRPr sz="2200"/>
             </a:lvl9pPr>
           </a:lstStyle>
           <a:p>
             <a:pPr lvl="0"/>
             <a:r>
-              <a:rPr lang="en-US"/>
+              <a:rPr lang="en-US" smtClean="0"/>
               <a:t>Click to edit Master text styles</a:t>
             </a:r>
           </a:p>
           <a:p>
             <a:pPr lvl="1"/>
             <a:r>
-              <a:rPr lang="en-US"/>
+              <a:rPr lang="en-US" smtClean="0"/>
               <a:t>Second level</a:t>
             </a:r>
           </a:p>
           <a:p>
             <a:pPr lvl="2"/>
             <a:r>
-              <a:rPr lang="en-US"/>
+              <a:rPr lang="en-US" smtClean="0"/>
               <a:t>Third level</a:t>
             </a:r>
           </a:p>
           <a:p>
             <a:pPr lvl="3"/>
             <a:r>
-              <a:rPr lang="en-US"/>
+              <a:rPr lang="en-US" smtClean="0"/>
               <a:t>Fourth level</a:t>
             </a:r>
           </a:p>
           <a:p>
             <a:pPr lvl="4"/>
             <a:r>
-              <a:rPr lang="en-US"/>
+              <a:rPr lang="en-US" smtClean="0"/>
               <a:t>Fifth level</a:t>
             </a:r>
             <a:endParaRPr lang="en-GB"/>
@@ -2242,8 +2189,8 @@
         </p:nvSpPr>
         <p:spPr>
           <a:xfrm>
-            <a:off x="378145" y="1115526"/>
-            <a:ext cx="2488126" cy="3646433"/>
+            <a:off x="534909" y="1582598"/>
+            <a:ext cx="3519622" cy="5173200"/>
           </a:xfrm>
         </p:spPr>
         <p:txBody>
@@ -2251,45 +2198,45 @@
           <a:lstStyle>
             <a:lvl1pPr marL="0" indent="0">
               <a:buNone/>
-              <a:defRPr sz="800"/>
+              <a:defRPr sz="1500"/>
             </a:lvl1pPr>
-            <a:lvl2pPr marL="263113" indent="0">
-              <a:buNone/>
-              <a:defRPr sz="700"/>
+            <a:lvl2pPr marL="497982" indent="0">
+              <a:buNone/>
+              <a:defRPr sz="1300"/>
             </a:lvl2pPr>
-            <a:lvl3pPr marL="526227" indent="0">
-              <a:buNone/>
-              <a:defRPr sz="600"/>
+            <a:lvl3pPr marL="995964" indent="0">
+              <a:buNone/>
+              <a:defRPr sz="1100"/>
             </a:lvl3pPr>
-            <a:lvl4pPr marL="789341" indent="0">
-              <a:buNone/>
-              <a:defRPr sz="500"/>
+            <a:lvl4pPr marL="1493947" indent="0">
+              <a:buNone/>
+              <a:defRPr sz="1000"/>
             </a:lvl4pPr>
-            <a:lvl5pPr marL="1052454" indent="0">
-              <a:buNone/>
-              <a:defRPr sz="500"/>
+            <a:lvl5pPr marL="1991929" indent="0">
+              <a:buNone/>
+              <a:defRPr sz="1000"/>
             </a:lvl5pPr>
-            <a:lvl6pPr marL="1315568" indent="0">
-              <a:buNone/>
-              <a:defRPr sz="500"/>
+            <a:lvl6pPr marL="2489911" indent="0">
+              <a:buNone/>
+              <a:defRPr sz="1000"/>
             </a:lvl6pPr>
-            <a:lvl7pPr marL="1578681" indent="0">
-              <a:buNone/>
-              <a:defRPr sz="500"/>
+            <a:lvl7pPr marL="2987893" indent="0">
+              <a:buNone/>
+              <a:defRPr sz="1000"/>
             </a:lvl7pPr>
-            <a:lvl8pPr marL="1841794" indent="0">
-              <a:buNone/>
-              <a:defRPr sz="500"/>
+            <a:lvl8pPr marL="3485876" indent="0">
+              <a:buNone/>
+              <a:defRPr sz="1000"/>
             </a:lvl8pPr>
-            <a:lvl9pPr marL="2104908" indent="0">
-              <a:buNone/>
-              <a:defRPr sz="500"/>
+            <a:lvl9pPr marL="3983858" indent="0">
+              <a:buNone/>
+              <a:defRPr sz="1000"/>
             </a:lvl9pPr>
           </a:lstStyle>
           <a:p>
             <a:pPr lvl="0"/>
             <a:r>
-              <a:rPr lang="en-US"/>
+              <a:rPr lang="en-US" smtClean="0"/>
               <a:t>Click to edit Master text styles</a:t>
             </a:r>
           </a:p>
@@ -2312,7 +2259,7 @@
           <a:p>
             <a:fld id="{6BA5D40C-A8DC-479A-A5D3-E7B4936A184B}" type="datetimeFigureOut">
               <a:rPr lang="en-GB" smtClean="0"/>
-              <a:t>31/10/2019</a:t>
+              <a:t>15/07/2015</a:t>
             </a:fld>
             <a:endParaRPr lang="en-GB"/>
           </a:p>
@@ -2402,20 +2349,20 @@
         </p:nvSpPr>
         <p:spPr>
           <a:xfrm>
-            <a:off x="1482372" y="3731578"/>
-            <a:ext cx="4537710" cy="440534"/>
+            <a:off x="2096914" y="5293995"/>
+            <a:ext cx="6418898" cy="624986"/>
           </a:xfrm>
         </p:spPr>
         <p:txBody>
           <a:bodyPr anchor="b"/>
           <a:lstStyle>
             <a:lvl1pPr algn="l">
-              <a:defRPr sz="1200" b="1"/>
+              <a:defRPr sz="2200" b="1"/>
             </a:lvl1pPr>
           </a:lstStyle>
           <a:p>
             <a:r>
-              <a:rPr lang="en-US"/>
+              <a:rPr lang="en-US" smtClean="0"/>
               <a:t>Click to edit Master title style</a:t>
             </a:r>
             <a:endParaRPr lang="en-GB"/>
@@ -2434,8 +2381,8 @@
         </p:nvSpPr>
         <p:spPr>
           <a:xfrm>
-            <a:off x="1482372" y="476319"/>
-            <a:ext cx="4537710" cy="3198495"/>
+            <a:off x="2096914" y="675755"/>
+            <a:ext cx="6418898" cy="4537710"/>
           </a:xfrm>
         </p:spPr>
         <p:txBody>
@@ -2443,39 +2390,39 @@
           <a:lstStyle>
             <a:lvl1pPr marL="0" indent="0">
               <a:buNone/>
-              <a:defRPr sz="1800"/>
+              <a:defRPr sz="3500"/>
             </a:lvl1pPr>
-            <a:lvl2pPr marL="263113" indent="0">
-              <a:buNone/>
-              <a:defRPr sz="1600"/>
+            <a:lvl2pPr marL="497982" indent="0">
+              <a:buNone/>
+              <a:defRPr sz="3000"/>
             </a:lvl2pPr>
-            <a:lvl3pPr marL="526227" indent="0">
-              <a:buNone/>
-              <a:defRPr sz="1400"/>
+            <a:lvl3pPr marL="995964" indent="0">
+              <a:buNone/>
+              <a:defRPr sz="2600"/>
             </a:lvl3pPr>
-            <a:lvl4pPr marL="789341" indent="0">
-              <a:buNone/>
-              <a:defRPr sz="1200"/>
+            <a:lvl4pPr marL="1493947" indent="0">
+              <a:buNone/>
+              <a:defRPr sz="2200"/>
             </a:lvl4pPr>
-            <a:lvl5pPr marL="1052454" indent="0">
-              <a:buNone/>
-              <a:defRPr sz="1200"/>
+            <a:lvl5pPr marL="1991929" indent="0">
+              <a:buNone/>
+              <a:defRPr sz="2200"/>
             </a:lvl5pPr>
-            <a:lvl6pPr marL="1315568" indent="0">
-              <a:buNone/>
-              <a:defRPr sz="1200"/>
+            <a:lvl6pPr marL="2489911" indent="0">
+              <a:buNone/>
+              <a:defRPr sz="2200"/>
             </a:lvl6pPr>
-            <a:lvl7pPr marL="1578681" indent="0">
-              <a:buNone/>
-              <a:defRPr sz="1200"/>
+            <a:lvl7pPr marL="2987893" indent="0">
+              <a:buNone/>
+              <a:defRPr sz="2200"/>
             </a:lvl7pPr>
-            <a:lvl8pPr marL="1841794" indent="0">
-              <a:buNone/>
-              <a:defRPr sz="1200"/>
+            <a:lvl8pPr marL="3485876" indent="0">
+              <a:buNone/>
+              <a:defRPr sz="2200"/>
             </a:lvl8pPr>
-            <a:lvl9pPr marL="2104908" indent="0">
-              <a:buNone/>
-              <a:defRPr sz="1200"/>
+            <a:lvl9pPr marL="3983858" indent="0">
+              <a:buNone/>
+              <a:defRPr sz="2200"/>
             </a:lvl9pPr>
           </a:lstStyle>
           <a:p>
@@ -2495,8 +2442,8 @@
         </p:nvSpPr>
         <p:spPr>
           <a:xfrm>
-            <a:off x="1482372" y="4172112"/>
-            <a:ext cx="4537710" cy="625631"/>
+            <a:off x="2096914" y="5918981"/>
+            <a:ext cx="6418898" cy="887584"/>
           </a:xfrm>
         </p:spPr>
         <p:txBody>
@@ -2504,45 +2451,45 @@
           <a:lstStyle>
             <a:lvl1pPr marL="0" indent="0">
               <a:buNone/>
-              <a:defRPr sz="800"/>
+              <a:defRPr sz="1500"/>
             </a:lvl1pPr>
-            <a:lvl2pPr marL="263113" indent="0">
-              <a:buNone/>
-              <a:defRPr sz="700"/>
+            <a:lvl2pPr marL="497982" indent="0">
+              <a:buNone/>
+              <a:defRPr sz="1300"/>
             </a:lvl2pPr>
-            <a:lvl3pPr marL="526227" indent="0">
-              <a:buNone/>
-              <a:defRPr sz="600"/>
+            <a:lvl3pPr marL="995964" indent="0">
+              <a:buNone/>
+              <a:defRPr sz="1100"/>
             </a:lvl3pPr>
-            <a:lvl4pPr marL="789341" indent="0">
-              <a:buNone/>
-              <a:defRPr sz="500"/>
+            <a:lvl4pPr marL="1493947" indent="0">
+              <a:buNone/>
+              <a:defRPr sz="1000"/>
             </a:lvl4pPr>
-            <a:lvl5pPr marL="1052454" indent="0">
-              <a:buNone/>
-              <a:defRPr sz="500"/>
+            <a:lvl5pPr marL="1991929" indent="0">
+              <a:buNone/>
+              <a:defRPr sz="1000"/>
             </a:lvl5pPr>
-            <a:lvl6pPr marL="1315568" indent="0">
-              <a:buNone/>
-              <a:defRPr sz="500"/>
+            <a:lvl6pPr marL="2489911" indent="0">
+              <a:buNone/>
+              <a:defRPr sz="1000"/>
             </a:lvl6pPr>
-            <a:lvl7pPr marL="1578681" indent="0">
-              <a:buNone/>
-              <a:defRPr sz="500"/>
+            <a:lvl7pPr marL="2987893" indent="0">
+              <a:buNone/>
+              <a:defRPr sz="1000"/>
             </a:lvl7pPr>
-            <a:lvl8pPr marL="1841794" indent="0">
-              <a:buNone/>
-              <a:defRPr sz="500"/>
+            <a:lvl8pPr marL="3485876" indent="0">
+              <a:buNone/>
+              <a:defRPr sz="1000"/>
             </a:lvl8pPr>
-            <a:lvl9pPr marL="2104908" indent="0">
-              <a:buNone/>
-              <a:defRPr sz="500"/>
+            <a:lvl9pPr marL="3983858" indent="0">
+              <a:buNone/>
+              <a:defRPr sz="1000"/>
             </a:lvl9pPr>
           </a:lstStyle>
           <a:p>
             <a:pPr lvl="0"/>
             <a:r>
-              <a:rPr lang="en-US"/>
+              <a:rPr lang="en-US" smtClean="0"/>
               <a:t>Click to edit Master text styles</a:t>
             </a:r>
           </a:p>
@@ -2565,7 +2512,7 @@
           <a:p>
             <a:fld id="{6BA5D40C-A8DC-479A-A5D3-E7B4936A184B}" type="datetimeFigureOut">
               <a:rPr lang="en-GB" smtClean="0"/>
-              <a:t>31/10/2019</a:t>
+              <a:t>15/07/2015</a:t>
             </a:fld>
             <a:endParaRPr lang="en-GB"/>
           </a:p>
@@ -2660,21 +2607,21 @@
         </p:nvSpPr>
         <p:spPr>
           <a:xfrm>
-            <a:off x="378143" y="213480"/>
-            <a:ext cx="6806565" cy="888471"/>
+            <a:off x="534908" y="302865"/>
+            <a:ext cx="9628347" cy="1260475"/>
           </a:xfrm>
           <a:prstGeom prst="rect">
             <a:avLst/>
           </a:prstGeom>
         </p:spPr>
         <p:txBody>
-          <a:bodyPr vert="horz" lIns="52622" tIns="26311" rIns="52622" bIns="26311" rtlCol="0" anchor="ctr">
+          <a:bodyPr vert="horz" lIns="99596" tIns="49798" rIns="99596" bIns="49798" rtlCol="0" anchor="ctr">
             <a:normAutofit/>
           </a:bodyPr>
           <a:lstStyle/>
           <a:p>
             <a:r>
-              <a:rPr lang="en-US"/>
+              <a:rPr lang="en-US" smtClean="0"/>
               <a:t>Click to edit Master title style</a:t>
             </a:r>
             <a:endParaRPr lang="en-GB"/>
@@ -2693,50 +2640,50 @@
         </p:nvSpPr>
         <p:spPr>
           <a:xfrm>
-            <a:off x="378143" y="1243861"/>
-            <a:ext cx="6806565" cy="3518098"/>
+            <a:off x="534908" y="1764667"/>
+            <a:ext cx="9628347" cy="4991131"/>
           </a:xfrm>
           <a:prstGeom prst="rect">
             <a:avLst/>
           </a:prstGeom>
         </p:spPr>
         <p:txBody>
-          <a:bodyPr vert="horz" lIns="52622" tIns="26311" rIns="52622" bIns="26311" rtlCol="0">
+          <a:bodyPr vert="horz" lIns="99596" tIns="49798" rIns="99596" bIns="49798" rtlCol="0">
             <a:normAutofit/>
           </a:bodyPr>
           <a:lstStyle/>
           <a:p>
             <a:pPr lvl="0"/>
             <a:r>
-              <a:rPr lang="en-US"/>
+              <a:rPr lang="en-US" smtClean="0"/>
               <a:t>Click to edit Master text styles</a:t>
             </a:r>
           </a:p>
           <a:p>
             <a:pPr lvl="1"/>
             <a:r>
-              <a:rPr lang="en-US"/>
+              <a:rPr lang="en-US" smtClean="0"/>
               <a:t>Second level</a:t>
             </a:r>
           </a:p>
           <a:p>
             <a:pPr lvl="2"/>
             <a:r>
-              <a:rPr lang="en-US"/>
+              <a:rPr lang="en-US" smtClean="0"/>
               <a:t>Third level</a:t>
             </a:r>
           </a:p>
           <a:p>
             <a:pPr lvl="3"/>
             <a:r>
-              <a:rPr lang="en-US"/>
+              <a:rPr lang="en-US" smtClean="0"/>
               <a:t>Fourth level</a:t>
             </a:r>
           </a:p>
           <a:p>
             <a:pPr lvl="4"/>
             <a:r>
-              <a:rPr lang="en-US"/>
+              <a:rPr lang="en-US" smtClean="0"/>
               <a:t>Fifth level</a:t>
             </a:r>
             <a:endParaRPr lang="en-GB"/>
@@ -2755,18 +2702,18 @@
         </p:nvSpPr>
         <p:spPr>
           <a:xfrm>
-            <a:off x="378142" y="4940888"/>
-            <a:ext cx="1764665" cy="283817"/>
+            <a:off x="534908" y="7009644"/>
+            <a:ext cx="2496238" cy="402652"/>
           </a:xfrm>
           <a:prstGeom prst="rect">
             <a:avLst/>
           </a:prstGeom>
         </p:spPr>
         <p:txBody>
-          <a:bodyPr vert="horz" lIns="52622" tIns="26311" rIns="52622" bIns="26311" rtlCol="0" anchor="ctr"/>
+          <a:bodyPr vert="horz" lIns="99596" tIns="49798" rIns="99596" bIns="49798" rtlCol="0" anchor="ctr"/>
           <a:lstStyle>
             <a:lvl1pPr algn="l">
-              <a:defRPr sz="700">
+              <a:defRPr sz="1300">
                 <a:solidFill>
                   <a:schemeClr val="tx1">
                     <a:tint val="75000"/>
@@ -2778,7 +2725,7 @@
           <a:p>
             <a:fld id="{6BA5D40C-A8DC-479A-A5D3-E7B4936A184B}" type="datetimeFigureOut">
               <a:rPr lang="en-GB" smtClean="0"/>
-              <a:t>31/10/2019</a:t>
+              <a:t>15/07/2015</a:t>
             </a:fld>
             <a:endParaRPr lang="en-GB"/>
           </a:p>
@@ -2796,18 +2743,18 @@
         </p:nvSpPr>
         <p:spPr>
           <a:xfrm>
-            <a:off x="2583974" y="4940888"/>
-            <a:ext cx="2394903" cy="283817"/>
+            <a:off x="3655206" y="7009644"/>
+            <a:ext cx="3387752" cy="402652"/>
           </a:xfrm>
           <a:prstGeom prst="rect">
             <a:avLst/>
           </a:prstGeom>
         </p:spPr>
         <p:txBody>
-          <a:bodyPr vert="horz" lIns="52622" tIns="26311" rIns="52622" bIns="26311" rtlCol="0" anchor="ctr"/>
+          <a:bodyPr vert="horz" lIns="99596" tIns="49798" rIns="99596" bIns="49798" rtlCol="0" anchor="ctr"/>
           <a:lstStyle>
             <a:lvl1pPr algn="ctr">
-              <a:defRPr sz="700">
+              <a:defRPr sz="1300">
                 <a:solidFill>
                   <a:schemeClr val="tx1">
                     <a:tint val="75000"/>
@@ -2833,18 +2780,18 @@
         </p:nvSpPr>
         <p:spPr>
           <a:xfrm>
-            <a:off x="5420043" y="4940888"/>
-            <a:ext cx="1764665" cy="283817"/>
+            <a:off x="7667017" y="7009644"/>
+            <a:ext cx="2496238" cy="402652"/>
           </a:xfrm>
           <a:prstGeom prst="rect">
             <a:avLst/>
           </a:prstGeom>
         </p:spPr>
         <p:txBody>
-          <a:bodyPr vert="horz" lIns="52622" tIns="26311" rIns="52622" bIns="26311" rtlCol="0" anchor="ctr"/>
+          <a:bodyPr vert="horz" lIns="99596" tIns="49798" rIns="99596" bIns="49798" rtlCol="0" anchor="ctr"/>
           <a:lstStyle>
             <a:lvl1pPr algn="r">
-              <a:defRPr sz="700">
+              <a:defRPr sz="1300">
                 <a:solidFill>
                   <a:schemeClr val="tx1">
                     <a:tint val="75000"/>
@@ -2885,12 +2832,12 @@
   </p:sldLayoutIdLst>
   <p:txStyles>
     <p:titleStyle>
-      <a:lvl1pPr algn="ctr" defTabSz="526227" rtl="0" eaLnBrk="1" latinLnBrk="0" hangingPunct="1">
+      <a:lvl1pPr algn="ctr" defTabSz="995964" rtl="0" eaLnBrk="1" latinLnBrk="0" hangingPunct="1">
         <a:spcBef>
           <a:spcPct val="0"/>
         </a:spcBef>
         <a:buNone/>
-        <a:defRPr sz="2500" kern="1200">
+        <a:defRPr sz="4800" kern="1200">
           <a:solidFill>
             <a:schemeClr val="tx1"/>
           </a:solidFill>
@@ -2901,13 +2848,13 @@
       </a:lvl1pPr>
     </p:titleStyle>
     <p:bodyStyle>
-      <a:lvl1pPr marL="197335" indent="-197335" algn="l" defTabSz="526227" rtl="0" eaLnBrk="1" latinLnBrk="0" hangingPunct="1">
+      <a:lvl1pPr marL="373487" indent="-373487" algn="l" defTabSz="995964" rtl="0" eaLnBrk="1" latinLnBrk="0" hangingPunct="1">
         <a:spcBef>
           <a:spcPct val="20000"/>
         </a:spcBef>
         <a:buFont typeface="Arial" panose="020B0604020202020204" pitchFamily="34" charset="0"/>
         <a:buChar char="•"/>
-        <a:defRPr sz="1800" kern="1200">
+        <a:defRPr sz="3500" kern="1200">
           <a:solidFill>
             <a:schemeClr val="tx1"/>
           </a:solidFill>
@@ -2916,13 +2863,13 @@
           <a:cs typeface="+mn-cs"/>
         </a:defRPr>
       </a:lvl1pPr>
-      <a:lvl2pPr marL="427559" indent="-164446" algn="l" defTabSz="526227" rtl="0" eaLnBrk="1" latinLnBrk="0" hangingPunct="1">
+      <a:lvl2pPr marL="809221" indent="-311239" algn="l" defTabSz="995964" rtl="0" eaLnBrk="1" latinLnBrk="0" hangingPunct="1">
         <a:spcBef>
           <a:spcPct val="20000"/>
         </a:spcBef>
         <a:buFont typeface="Arial" panose="020B0604020202020204" pitchFamily="34" charset="0"/>
         <a:buChar char="–"/>
-        <a:defRPr sz="1600" kern="1200">
+        <a:defRPr sz="3000" kern="1200">
           <a:solidFill>
             <a:schemeClr val="tx1"/>
           </a:solidFill>
@@ -2931,13 +2878,13 @@
           <a:cs typeface="+mn-cs"/>
         </a:defRPr>
       </a:lvl2pPr>
-      <a:lvl3pPr marL="657784" indent="-131557" algn="l" defTabSz="526227" rtl="0" eaLnBrk="1" latinLnBrk="0" hangingPunct="1">
+      <a:lvl3pPr marL="1244956" indent="-248991" algn="l" defTabSz="995964" rtl="0" eaLnBrk="1" latinLnBrk="0" hangingPunct="1">
         <a:spcBef>
           <a:spcPct val="20000"/>
         </a:spcBef>
         <a:buFont typeface="Arial" panose="020B0604020202020204" pitchFamily="34" charset="0"/>
         <a:buChar char="•"/>
-        <a:defRPr sz="1400" kern="1200">
+        <a:defRPr sz="2600" kern="1200">
           <a:solidFill>
             <a:schemeClr val="tx1"/>
           </a:solidFill>
@@ -2946,13 +2893,13 @@
           <a:cs typeface="+mn-cs"/>
         </a:defRPr>
       </a:lvl3pPr>
-      <a:lvl4pPr marL="920897" indent="-131557" algn="l" defTabSz="526227" rtl="0" eaLnBrk="1" latinLnBrk="0" hangingPunct="1">
+      <a:lvl4pPr marL="1742938" indent="-248991" algn="l" defTabSz="995964" rtl="0" eaLnBrk="1" latinLnBrk="0" hangingPunct="1">
         <a:spcBef>
           <a:spcPct val="20000"/>
         </a:spcBef>
         <a:buFont typeface="Arial" panose="020B0604020202020204" pitchFamily="34" charset="0"/>
         <a:buChar char="–"/>
-        <a:defRPr sz="1200" kern="1200">
+        <a:defRPr sz="2200" kern="1200">
           <a:solidFill>
             <a:schemeClr val="tx1"/>
           </a:solidFill>
@@ -2961,13 +2908,13 @@
           <a:cs typeface="+mn-cs"/>
         </a:defRPr>
       </a:lvl4pPr>
-      <a:lvl5pPr marL="1184011" indent="-131557" algn="l" defTabSz="526227" rtl="0" eaLnBrk="1" latinLnBrk="0" hangingPunct="1">
+      <a:lvl5pPr marL="2240920" indent="-248991" algn="l" defTabSz="995964" rtl="0" eaLnBrk="1" latinLnBrk="0" hangingPunct="1">
         <a:spcBef>
           <a:spcPct val="20000"/>
         </a:spcBef>
         <a:buFont typeface="Arial" panose="020B0604020202020204" pitchFamily="34" charset="0"/>
         <a:buChar char="»"/>
-        <a:defRPr sz="1200" kern="1200">
+        <a:defRPr sz="2200" kern="1200">
           <a:solidFill>
             <a:schemeClr val="tx1"/>
           </a:solidFill>
@@ -2976,13 +2923,13 @@
           <a:cs typeface="+mn-cs"/>
         </a:defRPr>
       </a:lvl5pPr>
-      <a:lvl6pPr marL="1447125" indent="-131557" algn="l" defTabSz="526227" rtl="0" eaLnBrk="1" latinLnBrk="0" hangingPunct="1">
+      <a:lvl6pPr marL="2738902" indent="-248991" algn="l" defTabSz="995964" rtl="0" eaLnBrk="1" latinLnBrk="0" hangingPunct="1">
         <a:spcBef>
           <a:spcPct val="20000"/>
         </a:spcBef>
         <a:buFont typeface="Arial" panose="020B0604020202020204" pitchFamily="34" charset="0"/>
         <a:buChar char="•"/>
-        <a:defRPr sz="1200" kern="1200">
+        <a:defRPr sz="2200" kern="1200">
           <a:solidFill>
             <a:schemeClr val="tx1"/>
           </a:solidFill>
@@ -2991,13 +2938,13 @@
           <a:cs typeface="+mn-cs"/>
         </a:defRPr>
       </a:lvl6pPr>
-      <a:lvl7pPr marL="1710238" indent="-131557" algn="l" defTabSz="526227" rtl="0" eaLnBrk="1" latinLnBrk="0" hangingPunct="1">
+      <a:lvl7pPr marL="3236885" indent="-248991" algn="l" defTabSz="995964" rtl="0" eaLnBrk="1" latinLnBrk="0" hangingPunct="1">
         <a:spcBef>
           <a:spcPct val="20000"/>
         </a:spcBef>
         <a:buFont typeface="Arial" panose="020B0604020202020204" pitchFamily="34" charset="0"/>
         <a:buChar char="•"/>
-        <a:defRPr sz="1200" kern="1200">
+        <a:defRPr sz="2200" kern="1200">
           <a:solidFill>
             <a:schemeClr val="tx1"/>
           </a:solidFill>
@@ -3006,13 +2953,13 @@
           <a:cs typeface="+mn-cs"/>
         </a:defRPr>
       </a:lvl7pPr>
-      <a:lvl8pPr marL="1973351" indent="-131557" algn="l" defTabSz="526227" rtl="0" eaLnBrk="1" latinLnBrk="0" hangingPunct="1">
+      <a:lvl8pPr marL="3734867" indent="-248991" algn="l" defTabSz="995964" rtl="0" eaLnBrk="1" latinLnBrk="0" hangingPunct="1">
         <a:spcBef>
           <a:spcPct val="20000"/>
         </a:spcBef>
         <a:buFont typeface="Arial" panose="020B0604020202020204" pitchFamily="34" charset="0"/>
         <a:buChar char="•"/>
-        <a:defRPr sz="1200" kern="1200">
+        <a:defRPr sz="2200" kern="1200">
           <a:solidFill>
             <a:schemeClr val="tx1"/>
           </a:solidFill>
@@ -3021,13 +2968,13 @@
           <a:cs typeface="+mn-cs"/>
         </a:defRPr>
       </a:lvl8pPr>
-      <a:lvl9pPr marL="2236465" indent="-131557" algn="l" defTabSz="526227" rtl="0" eaLnBrk="1" latinLnBrk="0" hangingPunct="1">
+      <a:lvl9pPr marL="4232849" indent="-248991" algn="l" defTabSz="995964" rtl="0" eaLnBrk="1" latinLnBrk="0" hangingPunct="1">
         <a:spcBef>
           <a:spcPct val="20000"/>
         </a:spcBef>
         <a:buFont typeface="Arial" panose="020B0604020202020204" pitchFamily="34" charset="0"/>
         <a:buChar char="•"/>
-        <a:defRPr sz="1200" kern="1200">
+        <a:defRPr sz="2200" kern="1200">
           <a:solidFill>
             <a:schemeClr val="tx1"/>
           </a:solidFill>
@@ -3041,8 +2988,8 @@
       <a:defPPr>
         <a:defRPr lang="en-US"/>
       </a:defPPr>
-      <a:lvl1pPr marL="0" algn="l" defTabSz="526227" rtl="0" eaLnBrk="1" latinLnBrk="0" hangingPunct="1">
-        <a:defRPr sz="1100" kern="1200">
+      <a:lvl1pPr marL="0" algn="l" defTabSz="995964" rtl="0" eaLnBrk="1" latinLnBrk="0" hangingPunct="1">
+        <a:defRPr sz="2000" kern="1200">
           <a:solidFill>
             <a:schemeClr val="tx1"/>
           </a:solidFill>
@@ -3051,8 +2998,8 @@
           <a:cs typeface="+mn-cs"/>
         </a:defRPr>
       </a:lvl1pPr>
-      <a:lvl2pPr marL="263113" algn="l" defTabSz="526227" rtl="0" eaLnBrk="1" latinLnBrk="0" hangingPunct="1">
-        <a:defRPr sz="1100" kern="1200">
+      <a:lvl2pPr marL="497982" algn="l" defTabSz="995964" rtl="0" eaLnBrk="1" latinLnBrk="0" hangingPunct="1">
+        <a:defRPr sz="2000" kern="1200">
           <a:solidFill>
             <a:schemeClr val="tx1"/>
           </a:solidFill>
@@ -3061,8 +3008,8 @@
           <a:cs typeface="+mn-cs"/>
         </a:defRPr>
       </a:lvl2pPr>
-      <a:lvl3pPr marL="526227" algn="l" defTabSz="526227" rtl="0" eaLnBrk="1" latinLnBrk="0" hangingPunct="1">
-        <a:defRPr sz="1100" kern="1200">
+      <a:lvl3pPr marL="995964" algn="l" defTabSz="995964" rtl="0" eaLnBrk="1" latinLnBrk="0" hangingPunct="1">
+        <a:defRPr sz="2000" kern="1200">
           <a:solidFill>
             <a:schemeClr val="tx1"/>
           </a:solidFill>
@@ -3071,8 +3018,8 @@
           <a:cs typeface="+mn-cs"/>
         </a:defRPr>
       </a:lvl3pPr>
-      <a:lvl4pPr marL="789341" algn="l" defTabSz="526227" rtl="0" eaLnBrk="1" latinLnBrk="0" hangingPunct="1">
-        <a:defRPr sz="1100" kern="1200">
+      <a:lvl4pPr marL="1493947" algn="l" defTabSz="995964" rtl="0" eaLnBrk="1" latinLnBrk="0" hangingPunct="1">
+        <a:defRPr sz="2000" kern="1200">
           <a:solidFill>
             <a:schemeClr val="tx1"/>
           </a:solidFill>
@@ -3081,8 +3028,8 @@
           <a:cs typeface="+mn-cs"/>
         </a:defRPr>
       </a:lvl4pPr>
-      <a:lvl5pPr marL="1052454" algn="l" defTabSz="526227" rtl="0" eaLnBrk="1" latinLnBrk="0" hangingPunct="1">
-        <a:defRPr sz="1100" kern="1200">
+      <a:lvl5pPr marL="1991929" algn="l" defTabSz="995964" rtl="0" eaLnBrk="1" latinLnBrk="0" hangingPunct="1">
+        <a:defRPr sz="2000" kern="1200">
           <a:solidFill>
             <a:schemeClr val="tx1"/>
           </a:solidFill>
@@ -3091,8 +3038,8 @@
           <a:cs typeface="+mn-cs"/>
         </a:defRPr>
       </a:lvl5pPr>
-      <a:lvl6pPr marL="1315568" algn="l" defTabSz="526227" rtl="0" eaLnBrk="1" latinLnBrk="0" hangingPunct="1">
-        <a:defRPr sz="1100" kern="1200">
+      <a:lvl6pPr marL="2489911" algn="l" defTabSz="995964" rtl="0" eaLnBrk="1" latinLnBrk="0" hangingPunct="1">
+        <a:defRPr sz="2000" kern="1200">
           <a:solidFill>
             <a:schemeClr val="tx1"/>
           </a:solidFill>
@@ -3101,8 +3048,8 @@
           <a:cs typeface="+mn-cs"/>
         </a:defRPr>
       </a:lvl6pPr>
-      <a:lvl7pPr marL="1578681" algn="l" defTabSz="526227" rtl="0" eaLnBrk="1" latinLnBrk="0" hangingPunct="1">
-        <a:defRPr sz="1100" kern="1200">
+      <a:lvl7pPr marL="2987893" algn="l" defTabSz="995964" rtl="0" eaLnBrk="1" latinLnBrk="0" hangingPunct="1">
+        <a:defRPr sz="2000" kern="1200">
           <a:solidFill>
             <a:schemeClr val="tx1"/>
           </a:solidFill>
@@ -3111,8 +3058,8 @@
           <a:cs typeface="+mn-cs"/>
         </a:defRPr>
       </a:lvl7pPr>
-      <a:lvl8pPr marL="1841794" algn="l" defTabSz="526227" rtl="0" eaLnBrk="1" latinLnBrk="0" hangingPunct="1">
-        <a:defRPr sz="1100" kern="1200">
+      <a:lvl8pPr marL="3485876" algn="l" defTabSz="995964" rtl="0" eaLnBrk="1" latinLnBrk="0" hangingPunct="1">
+        <a:defRPr sz="2000" kern="1200">
           <a:solidFill>
             <a:schemeClr val="tx1"/>
           </a:solidFill>
@@ -3121,8 +3068,8 @@
           <a:cs typeface="+mn-cs"/>
         </a:defRPr>
       </a:lvl8pPr>
-      <a:lvl9pPr marL="2104908" algn="l" defTabSz="526227" rtl="0" eaLnBrk="1" latinLnBrk="0" hangingPunct="1">
-        <a:defRPr sz="1100" kern="1200">
+      <a:lvl9pPr marL="3983858" algn="l" defTabSz="995964" rtl="0" eaLnBrk="1" latinLnBrk="0" hangingPunct="1">
+        <a:defRPr sz="2000" kern="1200">
           <a:solidFill>
             <a:schemeClr val="tx1"/>
           </a:solidFill>
@@ -3153,7 +3100,7 @@
           <a:chExt cx="0" cy="0"/>
         </a:xfrm>
       </p:grpSpPr>
-      <p:grpSp>
+      <p:grpSp xmlns:a="http://schemas.openxmlformats.org/drawingml/2006/main" xmlns:r="http://schemas.openxmlformats.org/officeDocument/2006/relationships" xmlns:p="http://schemas.openxmlformats.org/presentationml/2006/main" xmlns:pic="http://schemas.openxmlformats.org/drawingml/2006/picture">
         <p:nvGrpSpPr>
           <p:cNvPr id="2" name="grp1"/>
           <p:cNvGrpSpPr/>
@@ -3161,12 +3108,73 @@
         </p:nvGrpSpPr>
         <p:grpSpPr>
           <a:xfrm>
-            <a:off x="2589152" y="1809111"/>
-            <a:ext cx="2289319" cy="1693154"/>
-            <a:chOff x="2589152" y="1809111"/>
-            <a:chExt cx="2289319" cy="1693154"/>
+            <a:off x="1829594" y="1543050"/>
+            <a:ext cx="7038975" cy="4476750"/>
+            <a:chOff x="1829594" y="1543050"/>
+            <a:chExt cx="7038975" cy="4476750"/>
           </a:xfrm>
         </p:grpSpPr>
+        <p:sp>
+          <p:nvSpPr>
+            <p:cNvPr id="3" name="rc3"/>
+            <p:cNvSpPr/>
+            <p:nvPr/>
+          </p:nvSpPr>
+          <p:spPr>
+            <a:xfrm>
+              <a:off x="1829594" y="1543050"/>
+              <a:ext cx="7038975" cy="4476750"/>
+            </a:xfrm>
+            <a:prstGeom prst="rect">
+              <a:avLst/>
+            </a:prstGeom>
+            <a:solidFill>
+              <a:srgbClr val="FFFFFF">
+                <a:alpha val="100000"/>
+              </a:srgbClr>
+            </a:solidFill>
+            <a:ln w="9525" cap="rnd">
+              <a:solidFill>
+                <a:srgbClr val="FFFFFF">
+                  <a:alpha val="100000"/>
+                </a:srgbClr>
+              </a:solidFill>
+              <a:prstDash val="solid"/>
+              <a:round/>
+            </a:ln>
+          </p:spPr>
+          <p:txBody>
+            <a:bodyPr/>
+            <a:lstStyle/>
+            <a:p/>
+          </p:txBody>
+        </p:sp>
+        <p:sp>
+          <p:nvSpPr>
+            <p:cNvPr id="4" name="rc4"/>
+            <p:cNvSpPr/>
+            <p:nvPr/>
+          </p:nvSpPr>
+          <p:spPr>
+            <a:xfrm>
+              <a:off x="4156808" y="2907096"/>
+              <a:ext cx="2384545" cy="1748656"/>
+            </a:xfrm>
+            <a:prstGeom prst="rect">
+              <a:avLst/>
+            </a:prstGeom>
+            <a:solidFill>
+              <a:srgbClr val="003865">
+                <a:alpha val="100000"/>
+              </a:srgbClr>
+            </a:solidFill>
+          </p:spPr>
+          <p:txBody>
+            <a:bodyPr/>
+            <a:lstStyle/>
+            <a:p/>
+          </p:txBody>
+        </p:sp>
         <p:sp>
           <p:nvSpPr>
             <p:cNvPr id="5" name="tx5"/>
@@ -3175,7 +3183,7 @@
           </p:nvSpPr>
           <p:spPr>
             <a:xfrm>
-              <a:off x="2589152" y="1809111"/>
+              <a:off x="4156808" y="2925123"/>
               <a:ext cx="1226740" cy="103410"/>
             </a:xfrm>
             <a:prstGeom prst="rect">
@@ -3184,10 +3192,10 @@
             <a:noFill/>
           </p:spPr>
           <p:txBody>
-            <a:bodyPr wrap="none" lIns="0" tIns="0" rIns="0" bIns="0" anchor="ctr" anchorCtr="1"/>
+            <a:bodyPr lIns="0" rIns="0" tIns="0" bIns="0" anchorCtr="1" anchor="ctr" wrap="none"/>
             <a:lstStyle/>
             <a:p>
-              <a:pPr marL="0" marR="0" indent="0" algn="l">
+              <a:pPr algn="l" marL="0" marR="0" indent="0">
                 <a:lnSpc>
                   <a:spcPts val="1100"/>
                 </a:lnSpc>
@@ -3221,7 +3229,42 @@
           </p:nvSpPr>
           <p:spPr>
             <a:xfrm>
-              <a:off x="2626627" y="2041023"/>
+              <a:off x="4194283" y="3157035"/>
+              <a:ext cx="144506" cy="144506"/>
+            </a:xfrm>
+            <a:prstGeom prst="ellipse">
+              <a:avLst/>
+            </a:prstGeom>
+            <a:solidFill>
+              <a:srgbClr val="7F00FF">
+                <a:alpha val="100000"/>
+              </a:srgbClr>
+            </a:solidFill>
+            <a:ln w="9000" cap="rnd">
+              <a:solidFill>
+                <a:srgbClr val="7F00FF">
+                  <a:alpha val="100000"/>
+                </a:srgbClr>
+              </a:solidFill>
+              <a:prstDash val="solid"/>
+              <a:round/>
+            </a:ln>
+          </p:spPr>
+          <p:txBody>
+            <a:bodyPr/>
+            <a:lstStyle/>
+            <a:p/>
+          </p:txBody>
+        </p:sp>
+        <p:sp>
+          <p:nvSpPr>
+            <p:cNvPr id="7" name="pt7"/>
+            <p:cNvSpPr/>
+            <p:nvPr/>
+          </p:nvSpPr>
+          <p:spPr>
+            <a:xfrm>
+              <a:off x="4194283" y="3376491"/>
               <a:ext cx="144506" cy="144506"/>
             </a:xfrm>
             <a:prstGeom prst="ellipse">
@@ -3245,33 +3288,31 @@
           <p:txBody>
             <a:bodyPr/>
             <a:lstStyle/>
-            <a:p>
-              <a:endParaRPr/>
-            </a:p>
+            <a:p/>
           </p:txBody>
         </p:sp>
         <p:sp>
           <p:nvSpPr>
-            <p:cNvPr id="7" name="pt7"/>
+            <p:cNvPr id="8" name="pt8"/>
             <p:cNvSpPr/>
             <p:nvPr/>
           </p:nvSpPr>
           <p:spPr>
             <a:xfrm>
-              <a:off x="2626627" y="2260479"/>
+              <a:off x="4194283" y="3595947"/>
               <a:ext cx="144506" cy="144506"/>
             </a:xfrm>
             <a:prstGeom prst="ellipse">
               <a:avLst/>
             </a:prstGeom>
             <a:solidFill>
-              <a:srgbClr val="7F00FF">
+              <a:srgbClr val="FF0000">
                 <a:alpha val="100000"/>
               </a:srgbClr>
             </a:solidFill>
             <a:ln w="9000" cap="rnd">
               <a:solidFill>
-                <a:srgbClr val="7F00FF">
+                <a:srgbClr val="FF0000">
                   <a:alpha val="100000"/>
                 </a:srgbClr>
               </a:solidFill>
@@ -3282,20 +3323,123 @@
           <p:txBody>
             <a:bodyPr/>
             <a:lstStyle/>
-            <a:p>
-              <a:endParaRPr/>
-            </a:p>
+            <a:p/>
           </p:txBody>
         </p:sp>
         <p:sp>
           <p:nvSpPr>
-            <p:cNvPr id="8" name="pt8"/>
+            <p:cNvPr id="9" name="pt9"/>
             <p:cNvSpPr/>
             <p:nvPr/>
           </p:nvSpPr>
           <p:spPr>
             <a:xfrm>
-              <a:off x="2626627" y="2479935"/>
+              <a:off x="4194283" y="3815403"/>
+              <a:ext cx="144506" cy="144506"/>
+            </a:xfrm>
+            <a:prstGeom prst="ellipse">
+              <a:avLst/>
+            </a:prstGeom>
+            <a:solidFill>
+              <a:srgbClr val="00A84C">
+                <a:alpha val="100000"/>
+              </a:srgbClr>
+            </a:solidFill>
+            <a:ln w="9000" cap="rnd">
+              <a:solidFill>
+                <a:srgbClr val="00A84C">
+                  <a:alpha val="100000"/>
+                </a:srgbClr>
+              </a:solidFill>
+              <a:prstDash val="solid"/>
+              <a:round/>
+            </a:ln>
+          </p:spPr>
+          <p:txBody>
+            <a:bodyPr/>
+            <a:lstStyle/>
+            <a:p/>
+          </p:txBody>
+        </p:sp>
+        <p:sp>
+          <p:nvSpPr>
+            <p:cNvPr id="10" name="pt10"/>
+            <p:cNvSpPr/>
+            <p:nvPr/>
+          </p:nvSpPr>
+          <p:spPr>
+            <a:xfrm>
+              <a:off x="4194283" y="4034859"/>
+              <a:ext cx="144506" cy="144506"/>
+            </a:xfrm>
+            <a:prstGeom prst="ellipse">
+              <a:avLst/>
+            </a:prstGeom>
+            <a:solidFill>
+              <a:srgbClr val="00FFFF">
+                <a:alpha val="100000"/>
+              </a:srgbClr>
+            </a:solidFill>
+            <a:ln w="9000" cap="rnd">
+              <a:solidFill>
+                <a:srgbClr val="00FFFF">
+                  <a:alpha val="100000"/>
+                </a:srgbClr>
+              </a:solidFill>
+              <a:prstDash val="solid"/>
+              <a:round/>
+            </a:ln>
+          </p:spPr>
+          <p:txBody>
+            <a:bodyPr/>
+            <a:lstStyle/>
+            <a:p/>
+          </p:txBody>
+        </p:sp>
+        <p:sp>
+          <p:nvSpPr>
+            <p:cNvPr id="11" name="pt11"/>
+            <p:cNvSpPr/>
+            <p:nvPr/>
+          </p:nvSpPr>
+          <p:spPr>
+            <a:xfrm>
+              <a:off x="4194283" y="4254315"/>
+              <a:ext cx="144506" cy="144506"/>
+            </a:xfrm>
+            <a:prstGeom prst="ellipse">
+              <a:avLst/>
+            </a:prstGeom>
+            <a:solidFill>
+              <a:srgbClr val="7FFF00">
+                <a:alpha val="100000"/>
+              </a:srgbClr>
+            </a:solidFill>
+            <a:ln w="9000" cap="rnd">
+              <a:solidFill>
+                <a:srgbClr val="7FFF00">
+                  <a:alpha val="100000"/>
+                </a:srgbClr>
+              </a:solidFill>
+              <a:prstDash val="solid"/>
+              <a:round/>
+            </a:ln>
+          </p:spPr>
+          <p:txBody>
+            <a:bodyPr/>
+            <a:lstStyle/>
+            <a:p/>
+          </p:txBody>
+        </p:sp>
+        <p:sp>
+          <p:nvSpPr>
+            <p:cNvPr id="12" name="pt12"/>
+            <p:cNvSpPr/>
+            <p:nvPr/>
+          </p:nvSpPr>
+          <p:spPr>
+            <a:xfrm>
+              <a:off x="4194283" y="4473771"/>
               <a:ext cx="144506" cy="144506"/>
             </a:xfrm>
             <a:prstGeom prst="ellipse">
@@ -3319,157 +3463,7 @@
           <p:txBody>
             <a:bodyPr/>
             <a:lstStyle/>
-            <a:p>
-              <a:endParaRPr/>
-            </a:p>
-          </p:txBody>
-        </p:sp>
-        <p:sp>
-          <p:nvSpPr>
-            <p:cNvPr id="9" name="pt9"/>
-            <p:cNvSpPr/>
-            <p:nvPr/>
-          </p:nvSpPr>
-          <p:spPr>
-            <a:xfrm>
-              <a:off x="2626627" y="2699391"/>
-              <a:ext cx="144506" cy="144506"/>
-            </a:xfrm>
-            <a:prstGeom prst="ellipse">
-              <a:avLst/>
-            </a:prstGeom>
-            <a:solidFill>
-              <a:srgbClr val="00A84C">
-                <a:alpha val="100000"/>
-              </a:srgbClr>
-            </a:solidFill>
-            <a:ln w="9000" cap="rnd">
-              <a:solidFill>
-                <a:srgbClr val="00A84C">
-                  <a:alpha val="100000"/>
-                </a:srgbClr>
-              </a:solidFill>
-              <a:prstDash val="solid"/>
-              <a:round/>
-            </a:ln>
-          </p:spPr>
-          <p:txBody>
-            <a:bodyPr/>
-            <a:lstStyle/>
-            <a:p>
-              <a:endParaRPr/>
-            </a:p>
-          </p:txBody>
-        </p:sp>
-        <p:sp>
-          <p:nvSpPr>
-            <p:cNvPr id="10" name="pt10"/>
-            <p:cNvSpPr/>
-            <p:nvPr/>
-          </p:nvSpPr>
-          <p:spPr>
-            <a:xfrm>
-              <a:off x="2626627" y="2918847"/>
-              <a:ext cx="144506" cy="144506"/>
-            </a:xfrm>
-            <a:prstGeom prst="ellipse">
-              <a:avLst/>
-            </a:prstGeom>
-            <a:solidFill>
-              <a:srgbClr val="00FFFF">
-                <a:alpha val="100000"/>
-              </a:srgbClr>
-            </a:solidFill>
-            <a:ln w="9000" cap="rnd">
-              <a:solidFill>
-                <a:srgbClr val="00FFFF">
-                  <a:alpha val="100000"/>
-                </a:srgbClr>
-              </a:solidFill>
-              <a:prstDash val="solid"/>
-              <a:round/>
-            </a:ln>
-          </p:spPr>
-          <p:txBody>
-            <a:bodyPr/>
-            <a:lstStyle/>
-            <a:p>
-              <a:endParaRPr/>
-            </a:p>
-          </p:txBody>
-        </p:sp>
-        <p:sp>
-          <p:nvSpPr>
-            <p:cNvPr id="11" name="pt11"/>
-            <p:cNvSpPr/>
-            <p:nvPr/>
-          </p:nvSpPr>
-          <p:spPr>
-            <a:xfrm>
-              <a:off x="2626627" y="3138303"/>
-              <a:ext cx="144506" cy="144506"/>
-            </a:xfrm>
-            <a:prstGeom prst="ellipse">
-              <a:avLst/>
-            </a:prstGeom>
-            <a:solidFill>
-              <a:srgbClr val="FF0000">
-                <a:alpha val="100000"/>
-              </a:srgbClr>
-            </a:solidFill>
-            <a:ln w="9000" cap="rnd">
-              <a:solidFill>
-                <a:srgbClr val="FF0000">
-                  <a:alpha val="100000"/>
-                </a:srgbClr>
-              </a:solidFill>
-              <a:prstDash val="solid"/>
-              <a:round/>
-            </a:ln>
-          </p:spPr>
-          <p:txBody>
-            <a:bodyPr/>
-            <a:lstStyle/>
-            <a:p>
-              <a:endParaRPr/>
-            </a:p>
-          </p:txBody>
-        </p:sp>
-        <p:sp>
-          <p:nvSpPr>
-            <p:cNvPr id="12" name="pt12"/>
-            <p:cNvSpPr/>
-            <p:nvPr/>
-          </p:nvSpPr>
-          <p:spPr>
-            <a:xfrm>
-              <a:off x="2626627" y="3357759"/>
-              <a:ext cx="144506" cy="144506"/>
-            </a:xfrm>
-            <a:prstGeom prst="ellipse">
-              <a:avLst/>
-            </a:prstGeom>
-            <a:solidFill>
-              <a:srgbClr val="7FFF00">
-                <a:alpha val="100000"/>
-              </a:srgbClr>
-            </a:solidFill>
-            <a:ln w="9000" cap="rnd">
-              <a:solidFill>
-                <a:srgbClr val="7FFF00">
-                  <a:alpha val="100000"/>
-                </a:srgbClr>
-              </a:solidFill>
-              <a:prstDash val="solid"/>
-              <a:round/>
-            </a:ln>
-          </p:spPr>
-          <p:txBody>
-            <a:bodyPr/>
-            <a:lstStyle/>
-            <a:p>
-              <a:endParaRPr/>
-            </a:p>
+            <a:p/>
           </p:txBody>
         </p:sp>
         <p:sp>
@@ -3480,7 +3474,7 @@
           </p:nvSpPr>
           <p:spPr>
             <a:xfrm>
-              <a:off x="2878197" y="2048392"/>
+              <a:off x="4445854" y="3164404"/>
               <a:ext cx="956726" cy="104884"/>
             </a:xfrm>
             <a:prstGeom prst="rect">
@@ -3489,10 +3483,10 @@
             <a:noFill/>
           </p:spPr>
           <p:txBody>
-            <a:bodyPr wrap="none" lIns="0" tIns="0" rIns="0" bIns="0" anchor="ctr" anchorCtr="1"/>
+            <a:bodyPr lIns="0" rIns="0" tIns="0" bIns="0" anchorCtr="1" anchor="ctr" wrap="none"/>
             <a:lstStyle/>
             <a:p>
-              <a:pPr marL="0" marR="0" indent="0" algn="l">
+              <a:pPr algn="l" marL="0" marR="0" indent="0">
                 <a:lnSpc>
                   <a:spcPts val="880"/>
                 </a:lnSpc>
@@ -3526,7 +3520,7 @@
           </p:nvSpPr>
           <p:spPr>
             <a:xfrm>
-              <a:off x="2878197" y="2267848"/>
+              <a:off x="4445854" y="3383860"/>
               <a:ext cx="801310" cy="104884"/>
             </a:xfrm>
             <a:prstGeom prst="rect">
@@ -3535,10 +3529,10 @@
             <a:noFill/>
           </p:spPr>
           <p:txBody>
-            <a:bodyPr wrap="none" lIns="0" tIns="0" rIns="0" bIns="0" anchor="ctr" anchorCtr="1"/>
+            <a:bodyPr lIns="0" rIns="0" tIns="0" bIns="0" anchorCtr="1" anchor="ctr" wrap="none"/>
             <a:lstStyle/>
             <a:p>
-              <a:pPr marL="0" marR="0" indent="0" algn="l">
+              <a:pPr algn="l" marL="0" marR="0" indent="0">
                 <a:lnSpc>
                   <a:spcPts val="880"/>
                 </a:lnSpc>
@@ -3572,7 +3566,7 @@
           </p:nvSpPr>
           <p:spPr>
             <a:xfrm>
-              <a:off x="2878197" y="2487304"/>
+              <a:off x="4445854" y="3603316"/>
               <a:ext cx="1000055" cy="104884"/>
             </a:xfrm>
             <a:prstGeom prst="rect">
@@ -3581,10 +3575,10 @@
             <a:noFill/>
           </p:spPr>
           <p:txBody>
-            <a:bodyPr wrap="none" lIns="0" tIns="0" rIns="0" bIns="0" anchor="ctr" anchorCtr="1"/>
+            <a:bodyPr lIns="0" rIns="0" tIns="0" bIns="0" anchorCtr="1" anchor="ctr" wrap="none"/>
             <a:lstStyle/>
             <a:p>
-              <a:pPr marL="0" marR="0" indent="0" algn="l">
+              <a:pPr algn="l" marL="0" marR="0" indent="0">
                 <a:lnSpc>
                   <a:spcPts val="880"/>
                 </a:lnSpc>
@@ -3618,7 +3612,7 @@
           </p:nvSpPr>
           <p:spPr>
             <a:xfrm>
-              <a:off x="2878197" y="2706760"/>
+              <a:off x="4445854" y="3822772"/>
               <a:ext cx="2000274" cy="104884"/>
             </a:xfrm>
             <a:prstGeom prst="rect">
@@ -3627,10 +3621,10 @@
             <a:noFill/>
           </p:spPr>
           <p:txBody>
-            <a:bodyPr wrap="none" lIns="0" tIns="0" rIns="0" bIns="0" anchor="ctr" anchorCtr="1"/>
+            <a:bodyPr lIns="0" rIns="0" tIns="0" bIns="0" anchorCtr="1" anchor="ctr" wrap="none"/>
             <a:lstStyle/>
             <a:p>
-              <a:pPr marL="0" marR="0" indent="0" algn="l">
+              <a:pPr algn="l" marL="0" marR="0" indent="0">
                 <a:lnSpc>
                   <a:spcPts val="880"/>
                 </a:lnSpc>
@@ -3664,7 +3658,7 @@
           </p:nvSpPr>
           <p:spPr>
             <a:xfrm>
-              <a:off x="2878197" y="2926216"/>
+              <a:off x="4445854" y="4042228"/>
               <a:ext cx="708049" cy="104884"/>
             </a:xfrm>
             <a:prstGeom prst="rect">
@@ -3673,10 +3667,10 @@
             <a:noFill/>
           </p:spPr>
           <p:txBody>
-            <a:bodyPr wrap="none" lIns="0" tIns="0" rIns="0" bIns="0" anchor="ctr" anchorCtr="1"/>
+            <a:bodyPr lIns="0" rIns="0" tIns="0" bIns="0" anchorCtr="1" anchor="ctr" wrap="none"/>
             <a:lstStyle/>
             <a:p>
-              <a:pPr marL="0" marR="0" indent="0" algn="l">
+              <a:pPr algn="l" marL="0" marR="0" indent="0">
                 <a:lnSpc>
                   <a:spcPts val="880"/>
                 </a:lnSpc>
@@ -3710,7 +3704,7 @@
           </p:nvSpPr>
           <p:spPr>
             <a:xfrm>
-              <a:off x="2878197" y="3145672"/>
+              <a:off x="4445854" y="4261684"/>
               <a:ext cx="1080819" cy="104884"/>
             </a:xfrm>
             <a:prstGeom prst="rect">
@@ -3719,10 +3713,10 @@
             <a:noFill/>
           </p:spPr>
           <p:txBody>
-            <a:bodyPr wrap="none" lIns="0" tIns="0" rIns="0" bIns="0" anchor="ctr" anchorCtr="1"/>
+            <a:bodyPr lIns="0" rIns="0" tIns="0" bIns="0" anchorCtr="1" anchor="ctr" wrap="none"/>
             <a:lstStyle/>
             <a:p>
-              <a:pPr marL="0" marR="0" indent="0" algn="l">
+              <a:pPr algn="l" marL="0" marR="0" indent="0">
                 <a:lnSpc>
                   <a:spcPts val="880"/>
                 </a:lnSpc>
@@ -3756,7 +3750,7 @@
           </p:nvSpPr>
           <p:spPr>
             <a:xfrm>
-              <a:off x="2878197" y="3365128"/>
+              <a:off x="4445854" y="4481140"/>
               <a:ext cx="1447422" cy="104884"/>
             </a:xfrm>
             <a:prstGeom prst="rect">
@@ -3765,10 +3759,10 @@
             <a:noFill/>
           </p:spPr>
           <p:txBody>
-            <a:bodyPr wrap="none" lIns="0" tIns="0" rIns="0" bIns="0" anchor="ctr" anchorCtr="1"/>
+            <a:bodyPr lIns="0" rIns="0" tIns="0" bIns="0" anchorCtr="1" anchor="ctr" wrap="none"/>
             <a:lstStyle/>
             <a:p>
-              <a:pPr marL="0" marR="0" indent="0" algn="l">
+              <a:pPr algn="l" marL="0" marR="0" indent="0">
                 <a:lnSpc>
                   <a:spcPts val="880"/>
                 </a:lnSpc>

</xml_diff>